<commit_message>
Fixing the legend of figures
</commit_message>
<xml_diff>
--- a/fig/DefaultsPaper.pptx
+++ b/fig/DefaultsPaper.pptx
@@ -7,8 +7,10 @@
   <p:sldIdLst>
     <p:sldId id="257" r:id="rId2"/>
     <p:sldId id="258" r:id="rId3"/>
-    <p:sldId id="260" r:id="rId4"/>
-    <p:sldId id="259" r:id="rId5"/>
+    <p:sldId id="261" r:id="rId4"/>
+    <p:sldId id="262" r:id="rId5"/>
+    <p:sldId id="260" r:id="rId6"/>
+    <p:sldId id="259" r:id="rId7"/>
   </p:sldIdLst>
   <p:sldSz cx="9144000" cy="6858000" type="screen4x3"/>
   <p:notesSz cx="6858000" cy="9144000"/>
@@ -126,6 +128,1073 @@
           <c:order val="0"/>
           <c:tx>
             <c:strRef>
+              <c:f>Performance!$F$1</c:f>
+              <c:strCache>
+                <c:ptCount val="1"/>
+                <c:pt idx="0">
+                  <c:v>Original</c:v>
+                </c:pt>
+              </c:strCache>
+            </c:strRef>
+          </c:tx>
+          <c:spPr>
+            <a:solidFill>
+              <a:schemeClr val="bg1">
+                <a:lumMod val="50000"/>
+              </a:schemeClr>
+            </a:solidFill>
+          </c:spPr>
+          <c:cat>
+            <c:strRef>
+              <c:f>Performance!$E$2:$E$21</c:f>
+              <c:strCache>
+                <c:ptCount val="20"/>
+                <c:pt idx="0">
+                  <c:v>Phoenix</c:v>
+                </c:pt>
+                <c:pt idx="1">
+                  <c:v>histogram</c:v>
+                </c:pt>
+                <c:pt idx="2">
+                  <c:v>kmeans</c:v>
+                </c:pt>
+                <c:pt idx="3">
+                  <c:v>linear_regression</c:v>
+                </c:pt>
+                <c:pt idx="4">
+                  <c:v>matrix_multiply</c:v>
+                </c:pt>
+                <c:pt idx="5">
+                  <c:v>pca</c:v>
+                </c:pt>
+                <c:pt idx="6">
+                  <c:v>reverse_index</c:v>
+                </c:pt>
+                <c:pt idx="7">
+                  <c:v>string_match</c:v>
+                </c:pt>
+                <c:pt idx="8">
+                  <c:v>word_count</c:v>
+                </c:pt>
+                <c:pt idx="9">
+                  <c:v>PARSEC</c:v>
+                </c:pt>
+                <c:pt idx="10">
+                  <c:v>blackscholes </c:v>
+                </c:pt>
+                <c:pt idx="11">
+                  <c:v>bodytrack </c:v>
+                </c:pt>
+                <c:pt idx="12">
+                  <c:v>dedup </c:v>
+                </c:pt>
+                <c:pt idx="13">
+                  <c:v>ferret </c:v>
+                </c:pt>
+                <c:pt idx="14">
+                  <c:v>fluidanimate </c:v>
+                </c:pt>
+                <c:pt idx="15">
+                  <c:v>streamcluster </c:v>
+                </c:pt>
+                <c:pt idx="16">
+                  <c:v>swaptions </c:v>
+                </c:pt>
+                <c:pt idx="17">
+                  <c:v>x264 </c:v>
+                </c:pt>
+                <c:pt idx="19">
+                  <c:v>AVERAGE</c:v>
+                </c:pt>
+              </c:strCache>
+            </c:strRef>
+          </c:cat>
+          <c:val>
+            <c:numRef>
+              <c:f>Performance!$F$2:$F$21</c:f>
+              <c:numCache>
+                <c:formatCode>General</c:formatCode>
+                <c:ptCount val="20"/>
+                <c:pt idx="1">
+                  <c:v>1.0</c:v>
+                </c:pt>
+                <c:pt idx="2">
+                  <c:v>1.0</c:v>
+                </c:pt>
+                <c:pt idx="3">
+                  <c:v>1.0</c:v>
+                </c:pt>
+                <c:pt idx="4">
+                  <c:v>1.0</c:v>
+                </c:pt>
+                <c:pt idx="5">
+                  <c:v>1.0</c:v>
+                </c:pt>
+                <c:pt idx="6">
+                  <c:v>1.0</c:v>
+                </c:pt>
+                <c:pt idx="7">
+                  <c:v>1.0</c:v>
+                </c:pt>
+                <c:pt idx="8">
+                  <c:v>1.0</c:v>
+                </c:pt>
+                <c:pt idx="10">
+                  <c:v>1.0</c:v>
+                </c:pt>
+                <c:pt idx="11">
+                  <c:v>1.0</c:v>
+                </c:pt>
+                <c:pt idx="12">
+                  <c:v>1.0</c:v>
+                </c:pt>
+                <c:pt idx="13">
+                  <c:v>1.0</c:v>
+                </c:pt>
+                <c:pt idx="14">
+                  <c:v>1.0</c:v>
+                </c:pt>
+                <c:pt idx="15">
+                  <c:v>1.0</c:v>
+                </c:pt>
+                <c:pt idx="16">
+                  <c:v>1.0</c:v>
+                </c:pt>
+                <c:pt idx="17">
+                  <c:v>1.0</c:v>
+                </c:pt>
+                <c:pt idx="19">
+                  <c:v>1.0</c:v>
+                </c:pt>
+              </c:numCache>
+            </c:numRef>
+          </c:val>
+        </c:ser>
+        <c:ser>
+          <c:idx val="1"/>
+          <c:order val="1"/>
+          <c:tx>
+            <c:strRef>
+              <c:f>Performance!$G$1</c:f>
+              <c:strCache>
+                <c:ptCount val="1"/>
+                <c:pt idx="0">
+                  <c:v>DEFAULTS-NoPred</c:v>
+                </c:pt>
+              </c:strCache>
+            </c:strRef>
+          </c:tx>
+          <c:spPr>
+            <a:solidFill>
+              <a:schemeClr val="tx1">
+                <a:lumMod val="65000"/>
+                <a:lumOff val="35000"/>
+              </a:schemeClr>
+            </a:solidFill>
+          </c:spPr>
+          <c:dLbls>
+            <c:dLbl>
+              <c:idx val="1"/>
+              <c:showVal val="1"/>
+            </c:dLbl>
+            <c:delete val="1"/>
+          </c:dLbls>
+          <c:cat>
+            <c:strRef>
+              <c:f>Performance!$E$2:$E$21</c:f>
+              <c:strCache>
+                <c:ptCount val="20"/>
+                <c:pt idx="0">
+                  <c:v>Phoenix</c:v>
+                </c:pt>
+                <c:pt idx="1">
+                  <c:v>histogram</c:v>
+                </c:pt>
+                <c:pt idx="2">
+                  <c:v>kmeans</c:v>
+                </c:pt>
+                <c:pt idx="3">
+                  <c:v>linear_regression</c:v>
+                </c:pt>
+                <c:pt idx="4">
+                  <c:v>matrix_multiply</c:v>
+                </c:pt>
+                <c:pt idx="5">
+                  <c:v>pca</c:v>
+                </c:pt>
+                <c:pt idx="6">
+                  <c:v>reverse_index</c:v>
+                </c:pt>
+                <c:pt idx="7">
+                  <c:v>string_match</c:v>
+                </c:pt>
+                <c:pt idx="8">
+                  <c:v>word_count</c:v>
+                </c:pt>
+                <c:pt idx="9">
+                  <c:v>PARSEC</c:v>
+                </c:pt>
+                <c:pt idx="10">
+                  <c:v>blackscholes </c:v>
+                </c:pt>
+                <c:pt idx="11">
+                  <c:v>bodytrack </c:v>
+                </c:pt>
+                <c:pt idx="12">
+                  <c:v>dedup </c:v>
+                </c:pt>
+                <c:pt idx="13">
+                  <c:v>ferret </c:v>
+                </c:pt>
+                <c:pt idx="14">
+                  <c:v>fluidanimate </c:v>
+                </c:pt>
+                <c:pt idx="15">
+                  <c:v>streamcluster </c:v>
+                </c:pt>
+                <c:pt idx="16">
+                  <c:v>swaptions </c:v>
+                </c:pt>
+                <c:pt idx="17">
+                  <c:v>x264 </c:v>
+                </c:pt>
+                <c:pt idx="19">
+                  <c:v>AVERAGE</c:v>
+                </c:pt>
+              </c:strCache>
+            </c:strRef>
+          </c:cat>
+          <c:val>
+            <c:numRef>
+              <c:f>Performance!$G$2:$G$21</c:f>
+              <c:numCache>
+                <c:formatCode>General</c:formatCode>
+                <c:ptCount val="20"/>
+                <c:pt idx="1">
+                  <c:v>23.43650793719243</c:v>
+                </c:pt>
+                <c:pt idx="2">
+                  <c:v>12.30162977377767</c:v>
+                </c:pt>
+                <c:pt idx="3">
+                  <c:v>3.246626091537444</c:v>
+                </c:pt>
+                <c:pt idx="4">
+                  <c:v>1.451512905174464</c:v>
+                </c:pt>
+                <c:pt idx="5">
+                  <c:v>3.585815338811545</c:v>
+                </c:pt>
+                <c:pt idx="6">
+                  <c:v>6.97308367472883</c:v>
+                </c:pt>
+                <c:pt idx="7">
+                  <c:v>2.454966546504829</c:v>
+                </c:pt>
+                <c:pt idx="8">
+                  <c:v>3.449282296735483</c:v>
+                </c:pt>
+                <c:pt idx="10">
+                  <c:v>1.216110019634419</c:v>
+                </c:pt>
+                <c:pt idx="11">
+                  <c:v>8.844773789998928</c:v>
+                </c:pt>
+                <c:pt idx="12">
+                  <c:v>2.822429906274356</c:v>
+                </c:pt>
+                <c:pt idx="13">
+                  <c:v>11.87440139326621</c:v>
+                </c:pt>
+                <c:pt idx="14">
+                  <c:v>5.115598885399166</c:v>
+                </c:pt>
+                <c:pt idx="15">
+                  <c:v>5.878500646307626</c:v>
+                </c:pt>
+                <c:pt idx="16">
+                  <c:v>10.57627593942535</c:v>
+                </c:pt>
+                <c:pt idx="17">
+                  <c:v>1.131678189798801</c:v>
+                </c:pt>
+                <c:pt idx="19">
+                  <c:v>6.522449583410472</c:v>
+                </c:pt>
+              </c:numCache>
+            </c:numRef>
+          </c:val>
+        </c:ser>
+        <c:ser>
+          <c:idx val="2"/>
+          <c:order val="2"/>
+          <c:tx>
+            <c:strRef>
+              <c:f>Performance!$H$1</c:f>
+              <c:strCache>
+                <c:ptCount val="1"/>
+                <c:pt idx="0">
+                  <c:v>DEFAULTS</c:v>
+                </c:pt>
+              </c:strCache>
+            </c:strRef>
+          </c:tx>
+          <c:spPr>
+            <a:solidFill>
+              <a:schemeClr val="tx1"/>
+            </a:solidFill>
+          </c:spPr>
+          <c:dLbls>
+            <c:dLbl>
+              <c:idx val="1"/>
+              <c:showVal val="1"/>
+            </c:dLbl>
+            <c:delete val="1"/>
+          </c:dLbls>
+          <c:cat>
+            <c:strRef>
+              <c:f>Performance!$E$2:$E$21</c:f>
+              <c:strCache>
+                <c:ptCount val="20"/>
+                <c:pt idx="0">
+                  <c:v>Phoenix</c:v>
+                </c:pt>
+                <c:pt idx="1">
+                  <c:v>histogram</c:v>
+                </c:pt>
+                <c:pt idx="2">
+                  <c:v>kmeans</c:v>
+                </c:pt>
+                <c:pt idx="3">
+                  <c:v>linear_regression</c:v>
+                </c:pt>
+                <c:pt idx="4">
+                  <c:v>matrix_multiply</c:v>
+                </c:pt>
+                <c:pt idx="5">
+                  <c:v>pca</c:v>
+                </c:pt>
+                <c:pt idx="6">
+                  <c:v>reverse_index</c:v>
+                </c:pt>
+                <c:pt idx="7">
+                  <c:v>string_match</c:v>
+                </c:pt>
+                <c:pt idx="8">
+                  <c:v>word_count</c:v>
+                </c:pt>
+                <c:pt idx="9">
+                  <c:v>PARSEC</c:v>
+                </c:pt>
+                <c:pt idx="10">
+                  <c:v>blackscholes </c:v>
+                </c:pt>
+                <c:pt idx="11">
+                  <c:v>bodytrack </c:v>
+                </c:pt>
+                <c:pt idx="12">
+                  <c:v>dedup </c:v>
+                </c:pt>
+                <c:pt idx="13">
+                  <c:v>ferret </c:v>
+                </c:pt>
+                <c:pt idx="14">
+                  <c:v>fluidanimate </c:v>
+                </c:pt>
+                <c:pt idx="15">
+                  <c:v>streamcluster </c:v>
+                </c:pt>
+                <c:pt idx="16">
+                  <c:v>swaptions </c:v>
+                </c:pt>
+                <c:pt idx="17">
+                  <c:v>x264 </c:v>
+                </c:pt>
+                <c:pt idx="19">
+                  <c:v>AVERAGE</c:v>
+                </c:pt>
+              </c:strCache>
+            </c:strRef>
+          </c:cat>
+          <c:val>
+            <c:numRef>
+              <c:f>Performance!$H$2:$H$21</c:f>
+              <c:numCache>
+                <c:formatCode>General</c:formatCode>
+                <c:ptCount val="20"/>
+                <c:pt idx="1">
+                  <c:v>26.52222222312382</c:v>
+                </c:pt>
+                <c:pt idx="2">
+                  <c:v>12.0924349306738</c:v>
+                </c:pt>
+                <c:pt idx="3">
+                  <c:v>3.254829319925906</c:v>
+                </c:pt>
+                <c:pt idx="4">
+                  <c:v>1.465260462287403</c:v>
+                </c:pt>
+                <c:pt idx="5">
+                  <c:v>3.587118391683232</c:v>
+                </c:pt>
+                <c:pt idx="6">
+                  <c:v>6.977179637233256</c:v>
+                </c:pt>
+                <c:pt idx="7">
+                  <c:v>2.522388059606056</c:v>
+                </c:pt>
+                <c:pt idx="8">
+                  <c:v>3.43157894749099</c:v>
+                </c:pt>
+                <c:pt idx="10">
+                  <c:v>1.214882121805355</c:v>
+                </c:pt>
+                <c:pt idx="11">
+                  <c:v>8.872074882102456</c:v>
+                </c:pt>
+                <c:pt idx="12">
+                  <c:v>2.859813083874574</c:v>
+                </c:pt>
+                <c:pt idx="13">
+                  <c:v>11.65280801059046</c:v>
+                </c:pt>
+                <c:pt idx="14">
+                  <c:v>5.114902506457724</c:v>
+                </c:pt>
+                <c:pt idx="15">
+                  <c:v>5.875053856062042</c:v>
+                </c:pt>
+                <c:pt idx="16">
+                  <c:v>10.59282108800632</c:v>
+                </c:pt>
+                <c:pt idx="17">
+                  <c:v>1.155248271480525</c:v>
+                </c:pt>
+                <c:pt idx="19">
+                  <c:v>6.699413487025245</c:v>
+                </c:pt>
+              </c:numCache>
+            </c:numRef>
+          </c:val>
+        </c:ser>
+        <c:axId val="250798472"/>
+        <c:axId val="250801688"/>
+      </c:barChart>
+      <c:catAx>
+        <c:axId val="250798472"/>
+        <c:scaling>
+          <c:orientation val="minMax"/>
+        </c:scaling>
+        <c:axPos val="b"/>
+        <c:tickLblPos val="nextTo"/>
+        <c:txPr>
+          <a:bodyPr rot="-2700000"/>
+          <a:lstStyle/>
+          <a:p>
+            <a:pPr>
+              <a:defRPr sz="1000" b="1"/>
+            </a:pPr>
+            <a:endParaRPr lang="en-US"/>
+          </a:p>
+        </c:txPr>
+        <c:crossAx val="250801688"/>
+        <c:crosses val="autoZero"/>
+        <c:auto val="1"/>
+        <c:lblAlgn val="ctr"/>
+        <c:lblOffset val="100"/>
+      </c:catAx>
+      <c:valAx>
+        <c:axId val="250801688"/>
+        <c:scaling>
+          <c:orientation val="minMax"/>
+          <c:max val="16.0"/>
+        </c:scaling>
+        <c:axPos val="l"/>
+        <c:majorGridlines/>
+        <c:numFmt formatCode="General" sourceLinked="1"/>
+        <c:tickLblPos val="nextTo"/>
+        <c:crossAx val="250798472"/>
+        <c:crosses val="autoZero"/>
+        <c:crossBetween val="between"/>
+        <c:majorUnit val="2.0"/>
+      </c:valAx>
+    </c:plotArea>
+    <c:legend>
+      <c:legendPos val="r"/>
+      <c:layout>
+        <c:manualLayout>
+          <c:xMode val="edge"/>
+          <c:yMode val="edge"/>
+          <c:x val="0.802110922214269"/>
+          <c:y val="0.252138446722937"/>
+          <c:w val="0.17137392627058"/>
+          <c:h val="0.243924191355577"/>
+        </c:manualLayout>
+      </c:layout>
+    </c:legend>
+    <c:plotVisOnly val="1"/>
+  </c:chart>
+  <c:externalData r:id="rId1"/>
+  <c:userShapes r:id="rId2"/>
+</c:chartSpace>
+</file>
+
+<file path=ppt/charts/chart2.xml><?xml version="1.0" encoding="utf-8"?>
+<c:chartSpace xmlns:c="http://schemas.openxmlformats.org/drawingml/2006/chart" xmlns:a="http://schemas.openxmlformats.org/drawingml/2006/main" xmlns:r="http://schemas.openxmlformats.org/officeDocument/2006/relationships">
+  <c:date1904 val="1"/>
+  <c:lang val="en-US"/>
+  <c:style val="18"/>
+  <c:chart>
+    <c:plotArea>
+      <c:layout/>
+      <c:barChart>
+        <c:barDir val="col"/>
+        <c:grouping val="clustered"/>
+        <c:ser>
+          <c:idx val="0"/>
+          <c:order val="0"/>
+          <c:tx>
+            <c:strRef>
+              <c:f>Performance!$F$1</c:f>
+              <c:strCache>
+                <c:ptCount val="1"/>
+                <c:pt idx="0">
+                  <c:v>Original</c:v>
+                </c:pt>
+              </c:strCache>
+            </c:strRef>
+          </c:tx>
+          <c:spPr>
+            <a:solidFill>
+              <a:schemeClr val="bg1">
+                <a:lumMod val="50000"/>
+              </a:schemeClr>
+            </a:solidFill>
+          </c:spPr>
+          <c:cat>
+            <c:strRef>
+              <c:f>Performance!$E$2:$E$21</c:f>
+              <c:strCache>
+                <c:ptCount val="20"/>
+                <c:pt idx="0">
+                  <c:v>Phoenix</c:v>
+                </c:pt>
+                <c:pt idx="1">
+                  <c:v>histogram</c:v>
+                </c:pt>
+                <c:pt idx="2">
+                  <c:v>kmeans</c:v>
+                </c:pt>
+                <c:pt idx="3">
+                  <c:v>linear_regression</c:v>
+                </c:pt>
+                <c:pt idx="4">
+                  <c:v>matrix_multiply</c:v>
+                </c:pt>
+                <c:pt idx="5">
+                  <c:v>pca</c:v>
+                </c:pt>
+                <c:pt idx="6">
+                  <c:v>reverse_index</c:v>
+                </c:pt>
+                <c:pt idx="7">
+                  <c:v>string_match</c:v>
+                </c:pt>
+                <c:pt idx="8">
+                  <c:v>word_count</c:v>
+                </c:pt>
+                <c:pt idx="9">
+                  <c:v>PARSEC</c:v>
+                </c:pt>
+                <c:pt idx="10">
+                  <c:v>blackscholes </c:v>
+                </c:pt>
+                <c:pt idx="11">
+                  <c:v>bodytrack </c:v>
+                </c:pt>
+                <c:pt idx="12">
+                  <c:v>dedup </c:v>
+                </c:pt>
+                <c:pt idx="13">
+                  <c:v>ferret </c:v>
+                </c:pt>
+                <c:pt idx="14">
+                  <c:v>fluidanimate </c:v>
+                </c:pt>
+                <c:pt idx="15">
+                  <c:v>streamcluster </c:v>
+                </c:pt>
+                <c:pt idx="16">
+                  <c:v>swaptions </c:v>
+                </c:pt>
+                <c:pt idx="17">
+                  <c:v>x264 </c:v>
+                </c:pt>
+                <c:pt idx="19">
+                  <c:v>AVERAGE</c:v>
+                </c:pt>
+              </c:strCache>
+            </c:strRef>
+          </c:cat>
+          <c:val>
+            <c:numRef>
+              <c:f>Performance!$F$2:$F$21</c:f>
+              <c:numCache>
+                <c:formatCode>General</c:formatCode>
+                <c:ptCount val="20"/>
+                <c:pt idx="1">
+                  <c:v>1.0</c:v>
+                </c:pt>
+                <c:pt idx="2">
+                  <c:v>1.0</c:v>
+                </c:pt>
+                <c:pt idx="3">
+                  <c:v>1.0</c:v>
+                </c:pt>
+                <c:pt idx="4">
+                  <c:v>1.0</c:v>
+                </c:pt>
+                <c:pt idx="5">
+                  <c:v>1.0</c:v>
+                </c:pt>
+                <c:pt idx="6">
+                  <c:v>1.0</c:v>
+                </c:pt>
+                <c:pt idx="7">
+                  <c:v>1.0</c:v>
+                </c:pt>
+                <c:pt idx="8">
+                  <c:v>1.0</c:v>
+                </c:pt>
+                <c:pt idx="10">
+                  <c:v>1.0</c:v>
+                </c:pt>
+                <c:pt idx="11">
+                  <c:v>1.0</c:v>
+                </c:pt>
+                <c:pt idx="12">
+                  <c:v>1.0</c:v>
+                </c:pt>
+                <c:pt idx="13">
+                  <c:v>1.0</c:v>
+                </c:pt>
+                <c:pt idx="14">
+                  <c:v>1.0</c:v>
+                </c:pt>
+                <c:pt idx="15">
+                  <c:v>1.0</c:v>
+                </c:pt>
+                <c:pt idx="16">
+                  <c:v>1.0</c:v>
+                </c:pt>
+                <c:pt idx="17">
+                  <c:v>1.0</c:v>
+                </c:pt>
+                <c:pt idx="19">
+                  <c:v>1.0</c:v>
+                </c:pt>
+              </c:numCache>
+            </c:numRef>
+          </c:val>
+        </c:ser>
+        <c:ser>
+          <c:idx val="1"/>
+          <c:order val="1"/>
+          <c:tx>
+            <c:strRef>
+              <c:f>Performance!$G$1</c:f>
+              <c:strCache>
+                <c:ptCount val="1"/>
+                <c:pt idx="0">
+                  <c:v>DEFAULTS-NoPred</c:v>
+                </c:pt>
+              </c:strCache>
+            </c:strRef>
+          </c:tx>
+          <c:spPr>
+            <a:solidFill>
+              <a:schemeClr val="tx1">
+                <a:lumMod val="65000"/>
+                <a:lumOff val="35000"/>
+              </a:schemeClr>
+            </a:solidFill>
+          </c:spPr>
+          <c:cat>
+            <c:strRef>
+              <c:f>Performance!$E$2:$E$21</c:f>
+              <c:strCache>
+                <c:ptCount val="20"/>
+                <c:pt idx="0">
+                  <c:v>Phoenix</c:v>
+                </c:pt>
+                <c:pt idx="1">
+                  <c:v>histogram</c:v>
+                </c:pt>
+                <c:pt idx="2">
+                  <c:v>kmeans</c:v>
+                </c:pt>
+                <c:pt idx="3">
+                  <c:v>linear_regression</c:v>
+                </c:pt>
+                <c:pt idx="4">
+                  <c:v>matrix_multiply</c:v>
+                </c:pt>
+                <c:pt idx="5">
+                  <c:v>pca</c:v>
+                </c:pt>
+                <c:pt idx="6">
+                  <c:v>reverse_index</c:v>
+                </c:pt>
+                <c:pt idx="7">
+                  <c:v>string_match</c:v>
+                </c:pt>
+                <c:pt idx="8">
+                  <c:v>word_count</c:v>
+                </c:pt>
+                <c:pt idx="9">
+                  <c:v>PARSEC</c:v>
+                </c:pt>
+                <c:pt idx="10">
+                  <c:v>blackscholes </c:v>
+                </c:pt>
+                <c:pt idx="11">
+                  <c:v>bodytrack </c:v>
+                </c:pt>
+                <c:pt idx="12">
+                  <c:v>dedup </c:v>
+                </c:pt>
+                <c:pt idx="13">
+                  <c:v>ferret </c:v>
+                </c:pt>
+                <c:pt idx="14">
+                  <c:v>fluidanimate </c:v>
+                </c:pt>
+                <c:pt idx="15">
+                  <c:v>streamcluster </c:v>
+                </c:pt>
+                <c:pt idx="16">
+                  <c:v>swaptions </c:v>
+                </c:pt>
+                <c:pt idx="17">
+                  <c:v>x264 </c:v>
+                </c:pt>
+                <c:pt idx="19">
+                  <c:v>AVERAGE</c:v>
+                </c:pt>
+              </c:strCache>
+            </c:strRef>
+          </c:cat>
+          <c:val>
+            <c:numRef>
+              <c:f>Performance!$G$2:$G$21</c:f>
+              <c:numCache>
+                <c:formatCode>General</c:formatCode>
+                <c:ptCount val="20"/>
+                <c:pt idx="1">
+                  <c:v>23.43650793719243</c:v>
+                </c:pt>
+                <c:pt idx="2">
+                  <c:v>12.30162977377767</c:v>
+                </c:pt>
+                <c:pt idx="3">
+                  <c:v>3.246626091537444</c:v>
+                </c:pt>
+                <c:pt idx="4">
+                  <c:v>1.451512905174464</c:v>
+                </c:pt>
+                <c:pt idx="5">
+                  <c:v>3.585815338811545</c:v>
+                </c:pt>
+                <c:pt idx="6">
+                  <c:v>6.97308367472883</c:v>
+                </c:pt>
+                <c:pt idx="7">
+                  <c:v>2.454966546504829</c:v>
+                </c:pt>
+                <c:pt idx="8">
+                  <c:v>3.449282296735483</c:v>
+                </c:pt>
+                <c:pt idx="10">
+                  <c:v>1.216110019634419</c:v>
+                </c:pt>
+                <c:pt idx="11">
+                  <c:v>8.844773789998928</c:v>
+                </c:pt>
+                <c:pt idx="12">
+                  <c:v>2.822429906274356</c:v>
+                </c:pt>
+                <c:pt idx="13">
+                  <c:v>11.87440139326621</c:v>
+                </c:pt>
+                <c:pt idx="14">
+                  <c:v>5.115598885399166</c:v>
+                </c:pt>
+                <c:pt idx="15">
+                  <c:v>5.878500646307626</c:v>
+                </c:pt>
+                <c:pt idx="16">
+                  <c:v>10.57627593942535</c:v>
+                </c:pt>
+                <c:pt idx="17">
+                  <c:v>1.131678189798801</c:v>
+                </c:pt>
+                <c:pt idx="19">
+                  <c:v>6.522449583410472</c:v>
+                </c:pt>
+              </c:numCache>
+            </c:numRef>
+          </c:val>
+        </c:ser>
+        <c:ser>
+          <c:idx val="2"/>
+          <c:order val="2"/>
+          <c:tx>
+            <c:strRef>
+              <c:f>Performance!$H$1</c:f>
+              <c:strCache>
+                <c:ptCount val="1"/>
+                <c:pt idx="0">
+                  <c:v>DEFAULTS</c:v>
+                </c:pt>
+              </c:strCache>
+            </c:strRef>
+          </c:tx>
+          <c:spPr>
+            <a:solidFill>
+              <a:schemeClr val="tx1"/>
+            </a:solidFill>
+          </c:spPr>
+          <c:cat>
+            <c:strRef>
+              <c:f>Performance!$E$2:$E$21</c:f>
+              <c:strCache>
+                <c:ptCount val="20"/>
+                <c:pt idx="0">
+                  <c:v>Phoenix</c:v>
+                </c:pt>
+                <c:pt idx="1">
+                  <c:v>histogram</c:v>
+                </c:pt>
+                <c:pt idx="2">
+                  <c:v>kmeans</c:v>
+                </c:pt>
+                <c:pt idx="3">
+                  <c:v>linear_regression</c:v>
+                </c:pt>
+                <c:pt idx="4">
+                  <c:v>matrix_multiply</c:v>
+                </c:pt>
+                <c:pt idx="5">
+                  <c:v>pca</c:v>
+                </c:pt>
+                <c:pt idx="6">
+                  <c:v>reverse_index</c:v>
+                </c:pt>
+                <c:pt idx="7">
+                  <c:v>string_match</c:v>
+                </c:pt>
+                <c:pt idx="8">
+                  <c:v>word_count</c:v>
+                </c:pt>
+                <c:pt idx="9">
+                  <c:v>PARSEC</c:v>
+                </c:pt>
+                <c:pt idx="10">
+                  <c:v>blackscholes </c:v>
+                </c:pt>
+                <c:pt idx="11">
+                  <c:v>bodytrack </c:v>
+                </c:pt>
+                <c:pt idx="12">
+                  <c:v>dedup </c:v>
+                </c:pt>
+                <c:pt idx="13">
+                  <c:v>ferret </c:v>
+                </c:pt>
+                <c:pt idx="14">
+                  <c:v>fluidanimate </c:v>
+                </c:pt>
+                <c:pt idx="15">
+                  <c:v>streamcluster </c:v>
+                </c:pt>
+                <c:pt idx="16">
+                  <c:v>swaptions </c:v>
+                </c:pt>
+                <c:pt idx="17">
+                  <c:v>x264 </c:v>
+                </c:pt>
+                <c:pt idx="19">
+                  <c:v>AVERAGE</c:v>
+                </c:pt>
+              </c:strCache>
+            </c:strRef>
+          </c:cat>
+          <c:val>
+            <c:numRef>
+              <c:f>Performance!$H$2:$H$21</c:f>
+              <c:numCache>
+                <c:formatCode>General</c:formatCode>
+                <c:ptCount val="20"/>
+                <c:pt idx="1">
+                  <c:v>26.52222222312382</c:v>
+                </c:pt>
+                <c:pt idx="2">
+                  <c:v>12.0924349306738</c:v>
+                </c:pt>
+                <c:pt idx="3">
+                  <c:v>3.254829319925906</c:v>
+                </c:pt>
+                <c:pt idx="4">
+                  <c:v>1.465260462287403</c:v>
+                </c:pt>
+                <c:pt idx="5">
+                  <c:v>3.587118391683232</c:v>
+                </c:pt>
+                <c:pt idx="6">
+                  <c:v>6.977179637233256</c:v>
+                </c:pt>
+                <c:pt idx="7">
+                  <c:v>2.522388059606056</c:v>
+                </c:pt>
+                <c:pt idx="8">
+                  <c:v>3.43157894749099</c:v>
+                </c:pt>
+                <c:pt idx="10">
+                  <c:v>1.214882121805355</c:v>
+                </c:pt>
+                <c:pt idx="11">
+                  <c:v>8.872074882102456</c:v>
+                </c:pt>
+                <c:pt idx="12">
+                  <c:v>2.859813083874574</c:v>
+                </c:pt>
+                <c:pt idx="13">
+                  <c:v>11.65280801059046</c:v>
+                </c:pt>
+                <c:pt idx="14">
+                  <c:v>5.114902506457724</c:v>
+                </c:pt>
+                <c:pt idx="15">
+                  <c:v>5.875053856062042</c:v>
+                </c:pt>
+                <c:pt idx="16">
+                  <c:v>10.59282108800632</c:v>
+                </c:pt>
+                <c:pt idx="17">
+                  <c:v>1.155248271480525</c:v>
+                </c:pt>
+                <c:pt idx="19">
+                  <c:v>6.699413487025245</c:v>
+                </c:pt>
+              </c:numCache>
+            </c:numRef>
+          </c:val>
+        </c:ser>
+        <c:axId val="458332920"/>
+        <c:axId val="250867592"/>
+      </c:barChart>
+      <c:catAx>
+        <c:axId val="458332920"/>
+        <c:scaling>
+          <c:orientation val="minMax"/>
+        </c:scaling>
+        <c:axPos val="b"/>
+        <c:tickLblPos val="nextTo"/>
+        <c:txPr>
+          <a:bodyPr rot="-2700000"/>
+          <a:lstStyle/>
+          <a:p>
+            <a:pPr>
+              <a:defRPr sz="1000" b="1"/>
+            </a:pPr>
+            <a:endParaRPr lang="en-US"/>
+          </a:p>
+        </c:txPr>
+        <c:crossAx val="250867592"/>
+        <c:crosses val="autoZero"/>
+        <c:auto val="1"/>
+        <c:lblAlgn val="ctr"/>
+        <c:lblOffset val="100"/>
+      </c:catAx>
+      <c:valAx>
+        <c:axId val="250867592"/>
+        <c:scaling>
+          <c:orientation val="minMax"/>
+          <c:max val="16.0"/>
+        </c:scaling>
+        <c:axPos val="l"/>
+        <c:majorGridlines/>
+        <c:title>
+          <c:tx>
+            <c:rich>
+              <a:bodyPr/>
+              <a:lstStyle/>
+              <a:p>
+                <a:pPr>
+                  <a:defRPr/>
+                </a:pPr>
+                <a:r>
+                  <a:rPr lang="en-US"/>
+                  <a:t>Normalized Runtime</a:t>
+                </a:r>
+              </a:p>
+            </c:rich>
+          </c:tx>
+          <c:layout/>
+        </c:title>
+        <c:numFmt formatCode="General" sourceLinked="1"/>
+        <c:tickLblPos val="nextTo"/>
+        <c:crossAx val="458332920"/>
+        <c:crosses val="autoZero"/>
+        <c:crossBetween val="between"/>
+        <c:majorUnit val="2.0"/>
+      </c:valAx>
+    </c:plotArea>
+    <c:legend>
+      <c:legendPos val="r"/>
+      <c:layout>
+        <c:manualLayout>
+          <c:xMode val="edge"/>
+          <c:yMode val="edge"/>
+          <c:x val="0.805898801002147"/>
+          <c:y val="0.256634849600634"/>
+          <c:w val="0.17137392627058"/>
+          <c:h val="0.243924191355577"/>
+        </c:manualLayout>
+      </c:layout>
+      <c:txPr>
+        <a:bodyPr/>
+        <a:lstStyle/>
+        <a:p>
+          <a:pPr>
+            <a:defRPr sz="1000" b="1"/>
+          </a:pPr>
+          <a:endParaRPr lang="en-US"/>
+        </a:p>
+      </c:txPr>
+    </c:legend>
+    <c:plotVisOnly val="1"/>
+  </c:chart>
+  <c:externalData r:id="rId1"/>
+</c:chartSpace>
+</file>
+
+<file path=ppt/charts/chart3.xml><?xml version="1.0" encoding="utf-8"?>
+<c:chartSpace xmlns:c="http://schemas.openxmlformats.org/drawingml/2006/chart" xmlns:a="http://schemas.openxmlformats.org/drawingml/2006/main" xmlns:r="http://schemas.openxmlformats.org/officeDocument/2006/relationships">
+  <c:date1904 val="1"/>
+  <c:lang val="en-US"/>
+  <c:style val="18"/>
+  <c:chart>
+    <c:plotArea>
+      <c:layout/>
+      <c:barChart>
+        <c:barDir val="col"/>
+        <c:grouping val="clustered"/>
+        <c:ser>
+          <c:idx val="0"/>
+          <c:order val="0"/>
+          <c:tx>
+            <c:strRef>
               <c:f>MemoryUsage!$E$1</c:f>
               <c:strCache>
                 <c:ptCount val="1"/>
@@ -416,11 +1485,11 @@
             </c:numRef>
           </c:val>
         </c:ser>
-        <c:axId val="245811640"/>
-        <c:axId val="245802712"/>
+        <c:axId val="225121480"/>
+        <c:axId val="225112568"/>
       </c:barChart>
       <c:catAx>
-        <c:axId val="245811640"/>
+        <c:axId val="225121480"/>
         <c:scaling>
           <c:orientation val="minMax"/>
         </c:scaling>
@@ -436,14 +1505,14 @@
             <a:endParaRPr lang="en-US"/>
           </a:p>
         </c:txPr>
-        <c:crossAx val="245802712"/>
+        <c:crossAx val="225112568"/>
         <c:crosses val="autoZero"/>
         <c:auto val="1"/>
         <c:lblAlgn val="ctr"/>
         <c:lblOffset val="100"/>
       </c:catAx>
       <c:valAx>
-        <c:axId val="245802712"/>
+        <c:axId val="225112568"/>
         <c:scaling>
           <c:orientation val="minMax"/>
           <c:max val="1.8"/>
@@ -467,11 +1536,10 @@
               </a:p>
             </c:rich>
           </c:tx>
-          <c:layout/>
         </c:title>
         <c:numFmt formatCode="General" sourceLinked="1"/>
         <c:tickLblPos val="nextTo"/>
-        <c:crossAx val="245811640"/>
+        <c:crossAx val="225121480"/>
         <c:crosses val="autoZero"/>
         <c:crossBetween val="between"/>
         <c:majorUnit val="0.5"/>
@@ -504,6 +1572,83 @@
   </c:chart>
   <c:externalData r:id="rId1"/>
 </c:chartSpace>
+</file>
+
+<file path=ppt/drawings/drawing1.xml><?xml version="1.0" encoding="utf-8"?>
+<c:userShapes xmlns:c="http://schemas.openxmlformats.org/drawingml/2006/chart">
+  <cdr:relSizeAnchor xmlns:cdr="http://schemas.openxmlformats.org/drawingml/2006/chartDrawing">
+    <cdr:from>
+      <cdr:x>0.06439</cdr:x>
+      <cdr:y>0.13489</cdr:y>
+    </cdr:from>
+    <cdr:to>
+      <cdr:x>0.11869</cdr:x>
+      <cdr:y>0.2488</cdr:y>
+    </cdr:to>
+    <cdr:sp macro="" textlink="">
+      <cdr:nvSpPr>
+        <cdr:cNvPr id="2" name="TextBox 1"/>
+        <cdr:cNvSpPr txBox="1"/>
+      </cdr:nvSpPr>
+      <cdr:spPr>
+        <a:xfrm xmlns:a="http://schemas.openxmlformats.org/drawingml/2006/main">
+          <a:off x="431799" y="381000"/>
+          <a:ext cx="364067" cy="321734"/>
+        </a:xfrm>
+        <a:prstGeom xmlns:a="http://schemas.openxmlformats.org/drawingml/2006/main" prst="rect">
+          <a:avLst/>
+        </a:prstGeom>
+      </cdr:spPr>
+      <cdr:txBody>
+        <a:bodyPr xmlns:a="http://schemas.openxmlformats.org/drawingml/2006/main" wrap="none" rtlCol="0"/>
+        <a:lstStyle xmlns:a="http://schemas.openxmlformats.org/drawingml/2006/main"/>
+        <a:p xmlns:a="http://schemas.openxmlformats.org/drawingml/2006/main">
+          <a:r>
+            <a:rPr lang="en-US" sz="1100" dirty="0" smtClean="0"/>
+            <a:t>23.4</a:t>
+          </a:r>
+          <a:endParaRPr lang="en-US" sz="1100" dirty="0"/>
+        </a:p>
+      </cdr:txBody>
+    </cdr:sp>
+  </cdr:relSizeAnchor>
+  <cdr:relSizeAnchor xmlns:cdr="http://schemas.openxmlformats.org/drawingml/2006/chartDrawing">
+    <cdr:from>
+      <cdr:x>0.11364</cdr:x>
+      <cdr:y>0.06595</cdr:y>
+    </cdr:from>
+    <cdr:to>
+      <cdr:x>0.17424</cdr:x>
+      <cdr:y>0.15887</cdr:y>
+    </cdr:to>
+    <cdr:sp macro="" textlink="">
+      <cdr:nvSpPr>
+        <cdr:cNvPr id="3" name="TextBox 2"/>
+        <cdr:cNvSpPr txBox="1"/>
+      </cdr:nvSpPr>
+      <cdr:spPr>
+        <a:xfrm xmlns:a="http://schemas.openxmlformats.org/drawingml/2006/main">
+          <a:off x="762000" y="186267"/>
+          <a:ext cx="406400" cy="262467"/>
+        </a:xfrm>
+        <a:prstGeom xmlns:a="http://schemas.openxmlformats.org/drawingml/2006/main" prst="rect">
+          <a:avLst/>
+        </a:prstGeom>
+      </cdr:spPr>
+      <cdr:txBody>
+        <a:bodyPr xmlns:a="http://schemas.openxmlformats.org/drawingml/2006/main" wrap="none" rtlCol="0"/>
+        <a:lstStyle xmlns:a="http://schemas.openxmlformats.org/drawingml/2006/main"/>
+        <a:p xmlns:a="http://schemas.openxmlformats.org/drawingml/2006/main">
+          <a:r>
+            <a:rPr lang="en-US" sz="1100" dirty="0" smtClean="0"/>
+            <a:t>26.5</a:t>
+          </a:r>
+          <a:endParaRPr lang="en-US" sz="1100" dirty="0"/>
+        </a:p>
+      </cdr:txBody>
+    </cdr:sp>
+  </cdr:relSizeAnchor>
+</c:userShapes>
 </file>
 
 <file path=ppt/slideLayouts/slideLayout1.xml><?xml version="1.0" encoding="utf-8"?>
@@ -688,7 +1833,7 @@
             <a:fld id="{CD9E33B9-CE4A-C84C-B720-FE624F5655F3}" type="datetimeFigureOut">
               <a:rPr lang="en-US" smtClean="0"/>
               <a:pPr/>
-              <a:t>9/10/13</a:t>
+              <a:t>9/12/13</a:t>
             </a:fld>
             <a:endParaRPr lang="en-US" dirty="0"/>
           </a:p>
@@ -855,7 +2000,7 @@
             <a:fld id="{CD9E33B9-CE4A-C84C-B720-FE624F5655F3}" type="datetimeFigureOut">
               <a:rPr lang="en-US" smtClean="0"/>
               <a:pPr/>
-              <a:t>9/10/13</a:t>
+              <a:t>9/12/13</a:t>
             </a:fld>
             <a:endParaRPr lang="en-US" dirty="0"/>
           </a:p>
@@ -1032,7 +2177,7 @@
             <a:fld id="{CD9E33B9-CE4A-C84C-B720-FE624F5655F3}" type="datetimeFigureOut">
               <a:rPr lang="en-US" smtClean="0"/>
               <a:pPr/>
-              <a:t>9/10/13</a:t>
+              <a:t>9/12/13</a:t>
             </a:fld>
             <a:endParaRPr lang="en-US" dirty="0"/>
           </a:p>
@@ -1199,7 +2344,7 @@
             <a:fld id="{CD9E33B9-CE4A-C84C-B720-FE624F5655F3}" type="datetimeFigureOut">
               <a:rPr lang="en-US" smtClean="0"/>
               <a:pPr/>
-              <a:t>9/10/13</a:t>
+              <a:t>9/12/13</a:t>
             </a:fld>
             <a:endParaRPr lang="en-US" dirty="0"/>
           </a:p>
@@ -1442,7 +2587,7 @@
             <a:fld id="{CD9E33B9-CE4A-C84C-B720-FE624F5655F3}" type="datetimeFigureOut">
               <a:rPr lang="en-US" smtClean="0"/>
               <a:pPr/>
-              <a:t>9/10/13</a:t>
+              <a:t>9/12/13</a:t>
             </a:fld>
             <a:endParaRPr lang="en-US" dirty="0"/>
           </a:p>
@@ -1727,7 +2872,7 @@
             <a:fld id="{CD9E33B9-CE4A-C84C-B720-FE624F5655F3}" type="datetimeFigureOut">
               <a:rPr lang="en-US" smtClean="0"/>
               <a:pPr/>
-              <a:t>9/10/13</a:t>
+              <a:t>9/12/13</a:t>
             </a:fld>
             <a:endParaRPr lang="en-US" dirty="0"/>
           </a:p>
@@ -2146,7 +3291,7 @@
             <a:fld id="{CD9E33B9-CE4A-C84C-B720-FE624F5655F3}" type="datetimeFigureOut">
               <a:rPr lang="en-US" smtClean="0"/>
               <a:pPr/>
-              <a:t>9/10/13</a:t>
+              <a:t>9/12/13</a:t>
             </a:fld>
             <a:endParaRPr lang="en-US" dirty="0"/>
           </a:p>
@@ -2261,7 +3406,7 @@
             <a:fld id="{CD9E33B9-CE4A-C84C-B720-FE624F5655F3}" type="datetimeFigureOut">
               <a:rPr lang="en-US" smtClean="0"/>
               <a:pPr/>
-              <a:t>9/10/13</a:t>
+              <a:t>9/12/13</a:t>
             </a:fld>
             <a:endParaRPr lang="en-US" dirty="0"/>
           </a:p>
@@ -2353,7 +3498,7 @@
             <a:fld id="{CD9E33B9-CE4A-C84C-B720-FE624F5655F3}" type="datetimeFigureOut">
               <a:rPr lang="en-US" smtClean="0"/>
               <a:pPr/>
-              <a:t>9/10/13</a:t>
+              <a:t>9/12/13</a:t>
             </a:fld>
             <a:endParaRPr lang="en-US" dirty="0"/>
           </a:p>
@@ -2627,7 +3772,7 @@
             <a:fld id="{CD9E33B9-CE4A-C84C-B720-FE624F5655F3}" type="datetimeFigureOut">
               <a:rPr lang="en-US" smtClean="0"/>
               <a:pPr/>
-              <a:t>9/10/13</a:t>
+              <a:t>9/12/13</a:t>
             </a:fld>
             <a:endParaRPr lang="en-US" dirty="0"/>
           </a:p>
@@ -2877,7 +4022,7 @@
             <a:fld id="{CD9E33B9-CE4A-C84C-B720-FE624F5655F3}" type="datetimeFigureOut">
               <a:rPr lang="en-US" smtClean="0"/>
               <a:pPr/>
-              <a:t>9/10/13</a:t>
+              <a:t>9/12/13</a:t>
             </a:fld>
             <a:endParaRPr lang="en-US" dirty="0"/>
           </a:p>
@@ -3087,7 +4232,7 @@
             <a:fld id="{CD9E33B9-CE4A-C84C-B720-FE624F5655F3}" type="datetimeFigureOut">
               <a:rPr lang="en-US" smtClean="0"/>
               <a:pPr/>
-              <a:t>9/10/13</a:t>
+              <a:t>9/12/13</a:t>
             </a:fld>
             <a:endParaRPr lang="en-US" dirty="0"/>
           </a:p>
@@ -3458,1097 +4603,1082 @@
           <a:chExt cx="0" cy="0"/>
         </a:xfrm>
       </p:grpSpPr>
+      <p:sp>
+        <p:nvSpPr>
+          <p:cNvPr id="4" name="Rectangle 3"/>
+          <p:cNvSpPr/>
+          <p:nvPr/>
+        </p:nvSpPr>
+        <p:spPr>
+          <a:xfrm>
+            <a:off x="956340" y="391993"/>
+            <a:ext cx="2430039" cy="1005840"/>
+          </a:xfrm>
+          <a:prstGeom prst="rect">
+            <a:avLst/>
+          </a:prstGeom>
+          <a:noFill/>
+          <a:ln w="19050">
+            <a:solidFill>
+              <a:schemeClr val="tx1">
+                <a:lumMod val="95000"/>
+                <a:lumOff val="5000"/>
+              </a:schemeClr>
+            </a:solidFill>
+          </a:ln>
+        </p:spPr>
+        <p:style>
+          <a:lnRef idx="1">
+            <a:schemeClr val="accent1"/>
+          </a:lnRef>
+          <a:fillRef idx="3">
+            <a:schemeClr val="accent1"/>
+          </a:fillRef>
+          <a:effectRef idx="2">
+            <a:schemeClr val="accent1"/>
+          </a:effectRef>
+          <a:fontRef idx="minor">
+            <a:schemeClr val="lt1"/>
+          </a:fontRef>
+        </p:style>
+        <p:txBody>
+          <a:bodyPr rtlCol="0" anchor="ctr"/>
+          <a:lstStyle/>
+          <a:p>
+            <a:pPr algn="ctr"/>
+            <a:endParaRPr lang="en-US" dirty="0"/>
+          </a:p>
+        </p:txBody>
+      </p:sp>
+      <p:cxnSp>
+        <p:nvCxnSpPr>
+          <p:cNvPr id="6" name="Straight Connector 5"/>
+          <p:cNvCxnSpPr/>
+          <p:nvPr/>
+        </p:nvCxnSpPr>
+        <p:spPr>
+          <a:xfrm rot="5400000" flipH="1" flipV="1">
+            <a:off x="955107" y="395544"/>
+            <a:ext cx="1005839" cy="1003372"/>
+          </a:xfrm>
+          <a:prstGeom prst="line">
+            <a:avLst/>
+          </a:prstGeom>
+          <a:ln w="12700">
+            <a:solidFill>
+              <a:schemeClr val="tx1">
+                <a:lumMod val="95000"/>
+                <a:lumOff val="5000"/>
+              </a:schemeClr>
+            </a:solidFill>
+          </a:ln>
+        </p:spPr>
+        <p:style>
+          <a:lnRef idx="2">
+            <a:schemeClr val="accent1"/>
+          </a:lnRef>
+          <a:fillRef idx="0">
+            <a:schemeClr val="accent1"/>
+          </a:fillRef>
+          <a:effectRef idx="1">
+            <a:schemeClr val="accent1"/>
+          </a:effectRef>
+          <a:fontRef idx="minor">
+            <a:schemeClr val="tx1"/>
+          </a:fontRef>
+        </p:style>
+      </p:cxnSp>
+      <p:cxnSp>
+        <p:nvCxnSpPr>
+          <p:cNvPr id="8" name="Straight Connector 7"/>
+          <p:cNvCxnSpPr/>
+          <p:nvPr/>
+        </p:nvCxnSpPr>
+        <p:spPr>
+          <a:xfrm rot="5400000" flipH="1" flipV="1">
+            <a:off x="1226628" y="395544"/>
+            <a:ext cx="1005839" cy="1003372"/>
+          </a:xfrm>
+          <a:prstGeom prst="line">
+            <a:avLst/>
+          </a:prstGeom>
+          <a:ln w="12700">
+            <a:solidFill>
+              <a:schemeClr val="tx1">
+                <a:lumMod val="95000"/>
+                <a:lumOff val="5000"/>
+              </a:schemeClr>
+            </a:solidFill>
+          </a:ln>
+        </p:spPr>
+        <p:style>
+          <a:lnRef idx="2">
+            <a:schemeClr val="accent1"/>
+          </a:lnRef>
+          <a:fillRef idx="0">
+            <a:schemeClr val="accent1"/>
+          </a:fillRef>
+          <a:effectRef idx="1">
+            <a:schemeClr val="accent1"/>
+          </a:effectRef>
+          <a:fontRef idx="minor">
+            <a:schemeClr val="tx1"/>
+          </a:fontRef>
+        </p:style>
+      </p:cxnSp>
+      <p:cxnSp>
+        <p:nvCxnSpPr>
+          <p:cNvPr id="9" name="Straight Connector 8"/>
+          <p:cNvCxnSpPr/>
+          <p:nvPr/>
+        </p:nvCxnSpPr>
+        <p:spPr>
+          <a:xfrm rot="5400000" flipH="1" flipV="1">
+            <a:off x="1500948" y="400108"/>
+            <a:ext cx="1005839" cy="1003372"/>
+          </a:xfrm>
+          <a:prstGeom prst="line">
+            <a:avLst/>
+          </a:prstGeom>
+          <a:ln w="12700">
+            <a:solidFill>
+              <a:schemeClr val="tx1">
+                <a:lumMod val="95000"/>
+                <a:lumOff val="5000"/>
+              </a:schemeClr>
+            </a:solidFill>
+          </a:ln>
+        </p:spPr>
+        <p:style>
+          <a:lnRef idx="2">
+            <a:schemeClr val="accent1"/>
+          </a:lnRef>
+          <a:fillRef idx="0">
+            <a:schemeClr val="accent1"/>
+          </a:fillRef>
+          <a:effectRef idx="1">
+            <a:schemeClr val="accent1"/>
+          </a:effectRef>
+          <a:fontRef idx="minor">
+            <a:schemeClr val="tx1"/>
+          </a:fontRef>
+        </p:style>
+      </p:cxnSp>
+      <p:cxnSp>
+        <p:nvCxnSpPr>
+          <p:cNvPr id="10" name="Straight Connector 9"/>
+          <p:cNvCxnSpPr/>
+          <p:nvPr/>
+        </p:nvCxnSpPr>
+        <p:spPr>
+          <a:xfrm rot="5400000" flipH="1" flipV="1">
+            <a:off x="1775268" y="395544"/>
+            <a:ext cx="1005839" cy="1003372"/>
+          </a:xfrm>
+          <a:prstGeom prst="line">
+            <a:avLst/>
+          </a:prstGeom>
+          <a:ln w="12700">
+            <a:solidFill>
+              <a:schemeClr val="tx1">
+                <a:lumMod val="95000"/>
+                <a:lumOff val="5000"/>
+              </a:schemeClr>
+            </a:solidFill>
+          </a:ln>
+        </p:spPr>
+        <p:style>
+          <a:lnRef idx="2">
+            <a:schemeClr val="accent1"/>
+          </a:lnRef>
+          <a:fillRef idx="0">
+            <a:schemeClr val="accent1"/>
+          </a:fillRef>
+          <a:effectRef idx="1">
+            <a:schemeClr val="accent1"/>
+          </a:effectRef>
+          <a:fontRef idx="minor">
+            <a:schemeClr val="tx1"/>
+          </a:fontRef>
+        </p:style>
+      </p:cxnSp>
+      <p:cxnSp>
+        <p:nvCxnSpPr>
+          <p:cNvPr id="11" name="Straight Connector 10"/>
+          <p:cNvCxnSpPr/>
+          <p:nvPr/>
+        </p:nvCxnSpPr>
+        <p:spPr>
+          <a:xfrm rot="5400000" flipH="1" flipV="1">
+            <a:off x="2049588" y="395544"/>
+            <a:ext cx="1005839" cy="1003372"/>
+          </a:xfrm>
+          <a:prstGeom prst="line">
+            <a:avLst/>
+          </a:prstGeom>
+          <a:ln w="12700">
+            <a:solidFill>
+              <a:schemeClr val="tx1">
+                <a:lumMod val="95000"/>
+                <a:lumOff val="5000"/>
+              </a:schemeClr>
+            </a:solidFill>
+          </a:ln>
+        </p:spPr>
+        <p:style>
+          <a:lnRef idx="2">
+            <a:schemeClr val="accent1"/>
+          </a:lnRef>
+          <a:fillRef idx="0">
+            <a:schemeClr val="accent1"/>
+          </a:fillRef>
+          <a:effectRef idx="1">
+            <a:schemeClr val="accent1"/>
+          </a:effectRef>
+          <a:fontRef idx="minor">
+            <a:schemeClr val="tx1"/>
+          </a:fontRef>
+        </p:style>
+      </p:cxnSp>
+      <p:cxnSp>
+        <p:nvCxnSpPr>
+          <p:cNvPr id="12" name="Straight Connector 11"/>
+          <p:cNvCxnSpPr/>
+          <p:nvPr/>
+        </p:nvCxnSpPr>
+        <p:spPr>
+          <a:xfrm rot="5400000" flipH="1" flipV="1">
+            <a:off x="2323908" y="395544"/>
+            <a:ext cx="1005839" cy="1003372"/>
+          </a:xfrm>
+          <a:prstGeom prst="line">
+            <a:avLst/>
+          </a:prstGeom>
+          <a:ln w="12700">
+            <a:solidFill>
+              <a:schemeClr val="tx1">
+                <a:lumMod val="95000"/>
+                <a:lumOff val="5000"/>
+              </a:schemeClr>
+            </a:solidFill>
+          </a:ln>
+        </p:spPr>
+        <p:style>
+          <a:lnRef idx="2">
+            <a:schemeClr val="accent1"/>
+          </a:lnRef>
+          <a:fillRef idx="0">
+            <a:schemeClr val="accent1"/>
+          </a:fillRef>
+          <a:effectRef idx="1">
+            <a:schemeClr val="accent1"/>
+          </a:effectRef>
+          <a:fontRef idx="minor">
+            <a:schemeClr val="tx1"/>
+          </a:fontRef>
+        </p:style>
+      </p:cxnSp>
+      <p:cxnSp>
+        <p:nvCxnSpPr>
+          <p:cNvPr id="13" name="Straight Connector 12"/>
+          <p:cNvCxnSpPr/>
+          <p:nvPr/>
+        </p:nvCxnSpPr>
+        <p:spPr>
+          <a:xfrm flipV="1">
+            <a:off x="2599462" y="627191"/>
+            <a:ext cx="786919" cy="772959"/>
+          </a:xfrm>
+          <a:prstGeom prst="line">
+            <a:avLst/>
+          </a:prstGeom>
+          <a:ln w="12700">
+            <a:solidFill>
+              <a:schemeClr val="tx1">
+                <a:lumMod val="95000"/>
+                <a:lumOff val="5000"/>
+              </a:schemeClr>
+            </a:solidFill>
+          </a:ln>
+        </p:spPr>
+        <p:style>
+          <a:lnRef idx="2">
+            <a:schemeClr val="accent1"/>
+          </a:lnRef>
+          <a:fillRef idx="0">
+            <a:schemeClr val="accent1"/>
+          </a:fillRef>
+          <a:effectRef idx="1">
+            <a:schemeClr val="accent1"/>
+          </a:effectRef>
+          <a:fontRef idx="minor">
+            <a:schemeClr val="tx1"/>
+          </a:fontRef>
+        </p:style>
+      </p:cxnSp>
+      <p:cxnSp>
+        <p:nvCxnSpPr>
+          <p:cNvPr id="14" name="Straight Connector 13"/>
+          <p:cNvCxnSpPr/>
+          <p:nvPr/>
+        </p:nvCxnSpPr>
+        <p:spPr>
+          <a:xfrm rot="5400000" flipH="1" flipV="1">
+            <a:off x="953057" y="393197"/>
+            <a:ext cx="723357" cy="716787"/>
+          </a:xfrm>
+          <a:prstGeom prst="line">
+            <a:avLst/>
+          </a:prstGeom>
+          <a:ln w="12700">
+            <a:solidFill>
+              <a:schemeClr val="tx1">
+                <a:lumMod val="95000"/>
+                <a:lumOff val="5000"/>
+              </a:schemeClr>
+            </a:solidFill>
+          </a:ln>
+        </p:spPr>
+        <p:style>
+          <a:lnRef idx="2">
+            <a:schemeClr val="accent1"/>
+          </a:lnRef>
+          <a:fillRef idx="0">
+            <a:schemeClr val="accent1"/>
+          </a:fillRef>
+          <a:effectRef idx="1">
+            <a:schemeClr val="accent1"/>
+          </a:effectRef>
+          <a:fontRef idx="minor">
+            <a:schemeClr val="tx1"/>
+          </a:fontRef>
+        </p:style>
+      </p:cxnSp>
+      <p:cxnSp>
+        <p:nvCxnSpPr>
+          <p:cNvPr id="24" name="Straight Connector 23"/>
+          <p:cNvCxnSpPr/>
+          <p:nvPr/>
+        </p:nvCxnSpPr>
+        <p:spPr>
+          <a:xfrm flipV="1">
+            <a:off x="940662" y="398874"/>
+            <a:ext cx="462064" cy="397798"/>
+          </a:xfrm>
+          <a:prstGeom prst="line">
+            <a:avLst/>
+          </a:prstGeom>
+          <a:ln w="12700">
+            <a:solidFill>
+              <a:schemeClr val="tx1">
+                <a:lumMod val="95000"/>
+                <a:lumOff val="5000"/>
+              </a:schemeClr>
+            </a:solidFill>
+          </a:ln>
+        </p:spPr>
+        <p:style>
+          <a:lnRef idx="2">
+            <a:schemeClr val="accent1"/>
+          </a:lnRef>
+          <a:fillRef idx="0">
+            <a:schemeClr val="accent1"/>
+          </a:fillRef>
+          <a:effectRef idx="1">
+            <a:schemeClr val="accent1"/>
+          </a:effectRef>
+          <a:fontRef idx="minor">
+            <a:schemeClr val="tx1"/>
+          </a:fontRef>
+        </p:style>
+      </p:cxnSp>
+      <p:cxnSp>
+        <p:nvCxnSpPr>
+          <p:cNvPr id="28" name="Straight Connector 27"/>
+          <p:cNvCxnSpPr>
+            <a:cxnSpLocks noChangeAspect="1"/>
+          </p:cNvCxnSpPr>
+          <p:nvPr/>
+        </p:nvCxnSpPr>
+        <p:spPr>
+          <a:xfrm flipV="1">
+            <a:off x="2950938" y="936397"/>
+            <a:ext cx="453268" cy="445225"/>
+          </a:xfrm>
+          <a:prstGeom prst="line">
+            <a:avLst/>
+          </a:prstGeom>
+          <a:ln w="12700">
+            <a:solidFill>
+              <a:schemeClr val="tx1">
+                <a:lumMod val="95000"/>
+                <a:lumOff val="5000"/>
+              </a:schemeClr>
+            </a:solidFill>
+          </a:ln>
+        </p:spPr>
+        <p:style>
+          <a:lnRef idx="2">
+            <a:schemeClr val="accent1"/>
+          </a:lnRef>
+          <a:fillRef idx="0">
+            <a:schemeClr val="accent1"/>
+          </a:fillRef>
+          <a:effectRef idx="1">
+            <a:schemeClr val="accent1"/>
+          </a:effectRef>
+          <a:fontRef idx="minor">
+            <a:schemeClr val="tx1"/>
+          </a:fontRef>
+        </p:style>
+      </p:cxnSp>
+      <p:sp>
+        <p:nvSpPr>
+          <p:cNvPr id="32" name="Rectangle 31"/>
+          <p:cNvSpPr/>
+          <p:nvPr/>
+        </p:nvSpPr>
+        <p:spPr>
+          <a:xfrm flipH="1">
+            <a:off x="3394373" y="393192"/>
+            <a:ext cx="2432304" cy="1005840"/>
+          </a:xfrm>
+          <a:prstGeom prst="rect">
+            <a:avLst/>
+          </a:prstGeom>
+          <a:noFill/>
+          <a:ln w="19050">
+            <a:solidFill>
+              <a:schemeClr val="tx1">
+                <a:lumMod val="95000"/>
+                <a:lumOff val="5000"/>
+              </a:schemeClr>
+            </a:solidFill>
+          </a:ln>
+        </p:spPr>
+        <p:style>
+          <a:lnRef idx="1">
+            <a:schemeClr val="accent1"/>
+          </a:lnRef>
+          <a:fillRef idx="3">
+            <a:schemeClr val="accent1"/>
+          </a:fillRef>
+          <a:effectRef idx="2">
+            <a:schemeClr val="accent1"/>
+          </a:effectRef>
+          <a:fontRef idx="minor">
+            <a:schemeClr val="lt1"/>
+          </a:fontRef>
+        </p:style>
+        <p:txBody>
+          <a:bodyPr rtlCol="0" anchor="ctr"/>
+          <a:lstStyle/>
+          <a:p>
+            <a:pPr algn="ctr"/>
+            <a:endParaRPr lang="en-US" dirty="0"/>
+          </a:p>
+        </p:txBody>
+      </p:sp>
+      <p:cxnSp>
+        <p:nvCxnSpPr>
+          <p:cNvPr id="33" name="Straight Connector 32"/>
+          <p:cNvCxnSpPr/>
+          <p:nvPr/>
+        </p:nvCxnSpPr>
+        <p:spPr>
+          <a:xfrm rot="16200000" flipV="1">
+            <a:off x="4816826" y="392807"/>
+            <a:ext cx="1005839" cy="1001821"/>
+          </a:xfrm>
+          <a:prstGeom prst="line">
+            <a:avLst/>
+          </a:prstGeom>
+          <a:ln w="12700">
+            <a:solidFill>
+              <a:schemeClr val="tx1">
+                <a:lumMod val="95000"/>
+                <a:lumOff val="5000"/>
+              </a:schemeClr>
+            </a:solidFill>
+          </a:ln>
+        </p:spPr>
+        <p:style>
+          <a:lnRef idx="2">
+            <a:schemeClr val="accent1"/>
+          </a:lnRef>
+          <a:fillRef idx="0">
+            <a:schemeClr val="accent1"/>
+          </a:fillRef>
+          <a:effectRef idx="1">
+            <a:schemeClr val="accent1"/>
+          </a:effectRef>
+          <a:fontRef idx="minor">
+            <a:schemeClr val="tx1"/>
+          </a:fontRef>
+        </p:style>
+      </p:cxnSp>
+      <p:cxnSp>
+        <p:nvCxnSpPr>
+          <p:cNvPr id="34" name="Straight Connector 33"/>
+          <p:cNvCxnSpPr/>
+          <p:nvPr/>
+        </p:nvCxnSpPr>
+        <p:spPr>
+          <a:xfrm rot="16200000" flipV="1">
+            <a:off x="4545724" y="392807"/>
+            <a:ext cx="1005839" cy="1001821"/>
+          </a:xfrm>
+          <a:prstGeom prst="line">
+            <a:avLst/>
+          </a:prstGeom>
+          <a:ln w="12700">
+            <a:solidFill>
+              <a:schemeClr val="tx1">
+                <a:lumMod val="95000"/>
+                <a:lumOff val="5000"/>
+              </a:schemeClr>
+            </a:solidFill>
+          </a:ln>
+        </p:spPr>
+        <p:style>
+          <a:lnRef idx="2">
+            <a:schemeClr val="accent1"/>
+          </a:lnRef>
+          <a:fillRef idx="0">
+            <a:schemeClr val="accent1"/>
+          </a:fillRef>
+          <a:effectRef idx="1">
+            <a:schemeClr val="accent1"/>
+          </a:effectRef>
+          <a:fontRef idx="minor">
+            <a:schemeClr val="tx1"/>
+          </a:fontRef>
+        </p:style>
+      </p:cxnSp>
+      <p:cxnSp>
+        <p:nvCxnSpPr>
+          <p:cNvPr id="35" name="Straight Connector 34"/>
+          <p:cNvCxnSpPr/>
+          <p:nvPr/>
+        </p:nvCxnSpPr>
+        <p:spPr>
+          <a:xfrm rot="16200000" flipV="1">
+            <a:off x="4271828" y="397371"/>
+            <a:ext cx="1005839" cy="1001821"/>
+          </a:xfrm>
+          <a:prstGeom prst="line">
+            <a:avLst/>
+          </a:prstGeom>
+          <a:ln w="12700">
+            <a:solidFill>
+              <a:schemeClr val="tx1">
+                <a:lumMod val="95000"/>
+                <a:lumOff val="5000"/>
+              </a:schemeClr>
+            </a:solidFill>
+          </a:ln>
+        </p:spPr>
+        <p:style>
+          <a:lnRef idx="2">
+            <a:schemeClr val="accent1"/>
+          </a:lnRef>
+          <a:fillRef idx="0">
+            <a:schemeClr val="accent1"/>
+          </a:fillRef>
+          <a:effectRef idx="1">
+            <a:schemeClr val="accent1"/>
+          </a:effectRef>
+          <a:fontRef idx="minor">
+            <a:schemeClr val="tx1"/>
+          </a:fontRef>
+        </p:style>
+      </p:cxnSp>
+      <p:cxnSp>
+        <p:nvCxnSpPr>
+          <p:cNvPr id="36" name="Straight Connector 35"/>
+          <p:cNvCxnSpPr/>
+          <p:nvPr/>
+        </p:nvCxnSpPr>
+        <p:spPr>
+          <a:xfrm rot="16200000" flipV="1">
+            <a:off x="3997932" y="392807"/>
+            <a:ext cx="1005839" cy="1001821"/>
+          </a:xfrm>
+          <a:prstGeom prst="line">
+            <a:avLst/>
+          </a:prstGeom>
+          <a:ln w="12700">
+            <a:solidFill>
+              <a:schemeClr val="tx1">
+                <a:lumMod val="95000"/>
+                <a:lumOff val="5000"/>
+              </a:schemeClr>
+            </a:solidFill>
+          </a:ln>
+        </p:spPr>
+        <p:style>
+          <a:lnRef idx="2">
+            <a:schemeClr val="accent1"/>
+          </a:lnRef>
+          <a:fillRef idx="0">
+            <a:schemeClr val="accent1"/>
+          </a:fillRef>
+          <a:effectRef idx="1">
+            <a:schemeClr val="accent1"/>
+          </a:effectRef>
+          <a:fontRef idx="minor">
+            <a:schemeClr val="tx1"/>
+          </a:fontRef>
+        </p:style>
+      </p:cxnSp>
+      <p:cxnSp>
+        <p:nvCxnSpPr>
+          <p:cNvPr id="37" name="Straight Connector 36"/>
+          <p:cNvCxnSpPr/>
+          <p:nvPr/>
+        </p:nvCxnSpPr>
+        <p:spPr>
+          <a:xfrm rot="16200000" flipV="1">
+            <a:off x="3724036" y="392807"/>
+            <a:ext cx="1005839" cy="1001821"/>
+          </a:xfrm>
+          <a:prstGeom prst="line">
+            <a:avLst/>
+          </a:prstGeom>
+          <a:ln w="12700">
+            <a:solidFill>
+              <a:schemeClr val="tx1">
+                <a:lumMod val="95000"/>
+                <a:lumOff val="5000"/>
+              </a:schemeClr>
+            </a:solidFill>
+          </a:ln>
+        </p:spPr>
+        <p:style>
+          <a:lnRef idx="2">
+            <a:schemeClr val="accent1"/>
+          </a:lnRef>
+          <a:fillRef idx="0">
+            <a:schemeClr val="accent1"/>
+          </a:fillRef>
+          <a:effectRef idx="1">
+            <a:schemeClr val="accent1"/>
+          </a:effectRef>
+          <a:fontRef idx="minor">
+            <a:schemeClr val="tx1"/>
+          </a:fontRef>
+        </p:style>
+      </p:cxnSp>
+      <p:cxnSp>
+        <p:nvCxnSpPr>
+          <p:cNvPr id="38" name="Straight Connector 37"/>
+          <p:cNvCxnSpPr/>
+          <p:nvPr/>
+        </p:nvCxnSpPr>
+        <p:spPr>
+          <a:xfrm rot="16200000" flipV="1">
+            <a:off x="3450141" y="392807"/>
+            <a:ext cx="1005839" cy="1001821"/>
+          </a:xfrm>
+          <a:prstGeom prst="line">
+            <a:avLst/>
+          </a:prstGeom>
+          <a:ln w="12700">
+            <a:solidFill>
+              <a:schemeClr val="tx1">
+                <a:lumMod val="95000"/>
+                <a:lumOff val="5000"/>
+              </a:schemeClr>
+            </a:solidFill>
+          </a:ln>
+        </p:spPr>
+        <p:style>
+          <a:lnRef idx="2">
+            <a:schemeClr val="accent1"/>
+          </a:lnRef>
+          <a:fillRef idx="0">
+            <a:schemeClr val="accent1"/>
+          </a:fillRef>
+          <a:effectRef idx="1">
+            <a:schemeClr val="accent1"/>
+          </a:effectRef>
+          <a:fontRef idx="minor">
+            <a:schemeClr val="tx1"/>
+          </a:fontRef>
+        </p:style>
+      </p:cxnSp>
+      <p:cxnSp>
+        <p:nvCxnSpPr>
+          <p:cNvPr id="39" name="Straight Connector 38"/>
+          <p:cNvCxnSpPr/>
+          <p:nvPr/>
+        </p:nvCxnSpPr>
+        <p:spPr>
+          <a:xfrm flipH="1" flipV="1">
+            <a:off x="3394371" y="623679"/>
+            <a:ext cx="785703" cy="772959"/>
+          </a:xfrm>
+          <a:prstGeom prst="line">
+            <a:avLst/>
+          </a:prstGeom>
+          <a:ln w="12700">
+            <a:solidFill>
+              <a:schemeClr val="tx1">
+                <a:lumMod val="95000"/>
+                <a:lumOff val="5000"/>
+              </a:schemeClr>
+            </a:solidFill>
+          </a:ln>
+        </p:spPr>
+        <p:style>
+          <a:lnRef idx="2">
+            <a:schemeClr val="accent1"/>
+          </a:lnRef>
+          <a:fillRef idx="0">
+            <a:schemeClr val="accent1"/>
+          </a:fillRef>
+          <a:effectRef idx="1">
+            <a:schemeClr val="accent1"/>
+          </a:effectRef>
+          <a:fontRef idx="minor">
+            <a:schemeClr val="tx1"/>
+          </a:fontRef>
+        </p:style>
+      </p:cxnSp>
+      <p:cxnSp>
+        <p:nvCxnSpPr>
+          <p:cNvPr id="40" name="Straight Connector 39"/>
+          <p:cNvCxnSpPr/>
+          <p:nvPr/>
+        </p:nvCxnSpPr>
+        <p:spPr>
+          <a:xfrm rot="16200000" flipV="1">
+            <a:off x="5101136" y="390239"/>
+            <a:ext cx="723357" cy="715679"/>
+          </a:xfrm>
+          <a:prstGeom prst="line">
+            <a:avLst/>
+          </a:prstGeom>
+          <a:ln w="12700">
+            <a:solidFill>
+              <a:schemeClr val="tx1">
+                <a:lumMod val="95000"/>
+                <a:lumOff val="5000"/>
+              </a:schemeClr>
+            </a:solidFill>
+          </a:ln>
+        </p:spPr>
+        <p:style>
+          <a:lnRef idx="2">
+            <a:schemeClr val="accent1"/>
+          </a:lnRef>
+          <a:fillRef idx="0">
+            <a:schemeClr val="accent1"/>
+          </a:fillRef>
+          <a:effectRef idx="1">
+            <a:schemeClr val="accent1"/>
+          </a:effectRef>
+          <a:fontRef idx="minor">
+            <a:schemeClr val="tx1"/>
+          </a:fontRef>
+        </p:style>
+      </p:cxnSp>
+      <p:cxnSp>
+        <p:nvCxnSpPr>
+          <p:cNvPr id="41" name="Straight Connector 40"/>
+          <p:cNvCxnSpPr/>
+          <p:nvPr/>
+        </p:nvCxnSpPr>
+        <p:spPr>
+          <a:xfrm flipH="1" flipV="1">
+            <a:off x="5374960" y="395362"/>
+            <a:ext cx="461350" cy="397798"/>
+          </a:xfrm>
+          <a:prstGeom prst="line">
+            <a:avLst/>
+          </a:prstGeom>
+          <a:ln w="12700">
+            <a:solidFill>
+              <a:schemeClr val="tx1">
+                <a:lumMod val="95000"/>
+                <a:lumOff val="5000"/>
+              </a:schemeClr>
+            </a:solidFill>
+          </a:ln>
+        </p:spPr>
+        <p:style>
+          <a:lnRef idx="2">
+            <a:schemeClr val="accent1"/>
+          </a:lnRef>
+          <a:fillRef idx="0">
+            <a:schemeClr val="accent1"/>
+          </a:fillRef>
+          <a:effectRef idx="1">
+            <a:schemeClr val="accent1"/>
+          </a:effectRef>
+          <a:fontRef idx="minor">
+            <a:schemeClr val="tx1"/>
+          </a:fontRef>
+        </p:style>
+      </p:cxnSp>
+      <p:cxnSp>
+        <p:nvCxnSpPr>
+          <p:cNvPr id="42" name="Straight Connector 41"/>
+          <p:cNvCxnSpPr>
+            <a:cxnSpLocks noChangeAspect="1"/>
+          </p:cNvCxnSpPr>
+          <p:nvPr/>
+        </p:nvCxnSpPr>
+        <p:spPr>
+          <a:xfrm flipH="1" flipV="1">
+            <a:off x="3376574" y="932885"/>
+            <a:ext cx="452567" cy="445225"/>
+          </a:xfrm>
+          <a:prstGeom prst="line">
+            <a:avLst/>
+          </a:prstGeom>
+          <a:ln w="12700">
+            <a:solidFill>
+              <a:schemeClr val="tx1">
+                <a:lumMod val="95000"/>
+                <a:lumOff val="5000"/>
+              </a:schemeClr>
+            </a:solidFill>
+          </a:ln>
+        </p:spPr>
+        <p:style>
+          <a:lnRef idx="2">
+            <a:schemeClr val="accent1"/>
+          </a:lnRef>
+          <a:fillRef idx="0">
+            <a:schemeClr val="accent1"/>
+          </a:fillRef>
+          <a:effectRef idx="1">
+            <a:schemeClr val="accent1"/>
+          </a:effectRef>
+          <a:fontRef idx="minor">
+            <a:schemeClr val="tx1"/>
+          </a:fontRef>
+        </p:style>
+      </p:cxnSp>
+      <p:cxnSp>
+        <p:nvCxnSpPr>
+          <p:cNvPr id="46" name="Straight Connector 45"/>
+          <p:cNvCxnSpPr/>
+          <p:nvPr/>
+        </p:nvCxnSpPr>
+        <p:spPr>
+          <a:xfrm rot="5400000">
+            <a:off x="3227183" y="1747686"/>
+            <a:ext cx="304800" cy="1588"/>
+          </a:xfrm>
+          <a:prstGeom prst="line">
+            <a:avLst/>
+          </a:prstGeom>
+          <a:ln w="19050">
+            <a:solidFill>
+              <a:schemeClr val="tx1"/>
+            </a:solidFill>
+          </a:ln>
+        </p:spPr>
+        <p:style>
+          <a:lnRef idx="2">
+            <a:schemeClr val="accent1"/>
+          </a:lnRef>
+          <a:fillRef idx="0">
+            <a:schemeClr val="accent1"/>
+          </a:fillRef>
+          <a:effectRef idx="1">
+            <a:schemeClr val="accent1"/>
+          </a:effectRef>
+          <a:fontRef idx="minor">
+            <a:schemeClr val="tx1"/>
+          </a:fontRef>
+        </p:style>
+      </p:cxnSp>
+      <p:cxnSp>
+        <p:nvCxnSpPr>
+          <p:cNvPr id="47" name="Straight Connector 46"/>
+          <p:cNvCxnSpPr/>
+          <p:nvPr/>
+        </p:nvCxnSpPr>
+        <p:spPr>
+          <a:xfrm rot="5400000">
+            <a:off x="5678470" y="1732006"/>
+            <a:ext cx="304800" cy="1588"/>
+          </a:xfrm>
+          <a:prstGeom prst="line">
+            <a:avLst/>
+          </a:prstGeom>
+          <a:ln w="19050">
+            <a:solidFill>
+              <a:schemeClr val="tx1"/>
+            </a:solidFill>
+          </a:ln>
+        </p:spPr>
+        <p:style>
+          <a:lnRef idx="2">
+            <a:schemeClr val="accent1"/>
+          </a:lnRef>
+          <a:fillRef idx="0">
+            <a:schemeClr val="accent1"/>
+          </a:fillRef>
+          <a:effectRef idx="1">
+            <a:schemeClr val="accent1"/>
+          </a:effectRef>
+          <a:fontRef idx="minor">
+            <a:schemeClr val="tx1"/>
+          </a:fontRef>
+        </p:style>
+      </p:cxnSp>
+      <p:cxnSp>
+        <p:nvCxnSpPr>
+          <p:cNvPr id="48" name="Straight Connector 47"/>
+          <p:cNvCxnSpPr/>
+          <p:nvPr/>
+        </p:nvCxnSpPr>
+        <p:spPr>
+          <a:xfrm flipV="1">
+            <a:off x="946358" y="1888180"/>
+            <a:ext cx="4892040" cy="12700"/>
+          </a:xfrm>
+          <a:prstGeom prst="line">
+            <a:avLst/>
+          </a:prstGeom>
+          <a:ln w="19050">
+            <a:solidFill>
+              <a:schemeClr val="tx1"/>
+            </a:solidFill>
+          </a:ln>
+        </p:spPr>
+        <p:style>
+          <a:lnRef idx="2">
+            <a:schemeClr val="accent1"/>
+          </a:lnRef>
+          <a:fillRef idx="0">
+            <a:schemeClr val="accent1"/>
+          </a:fillRef>
+          <a:effectRef idx="1">
+            <a:schemeClr val="accent1"/>
+          </a:effectRef>
+          <a:fontRef idx="minor">
+            <a:schemeClr val="tx1"/>
+          </a:fontRef>
+        </p:style>
+      </p:cxnSp>
+      <p:sp>
+        <p:nvSpPr>
+          <p:cNvPr id="49" name="TextBox 48"/>
+          <p:cNvSpPr txBox="1"/>
+          <p:nvPr/>
+        </p:nvSpPr>
+        <p:spPr>
+          <a:xfrm>
+            <a:off x="1517859" y="1515868"/>
+            <a:ext cx="1315497" cy="369332"/>
+          </a:xfrm>
+          <a:prstGeom prst="rect">
+            <a:avLst/>
+          </a:prstGeom>
+          <a:noFill/>
+          <a:ln>
+            <a:noFill/>
+          </a:ln>
+        </p:spPr>
+        <p:txBody>
+          <a:bodyPr wrap="none" rtlCol="0">
+            <a:spAutoFit/>
+          </a:bodyPr>
+          <a:lstStyle/>
+          <a:p>
+            <a:r>
+              <a:rPr lang="en-US" dirty="0" smtClean="0"/>
+              <a:t>Cache line 1</a:t>
+            </a:r>
+            <a:endParaRPr lang="en-US" dirty="0"/>
+          </a:p>
+        </p:txBody>
+      </p:sp>
+      <p:sp>
+        <p:nvSpPr>
+          <p:cNvPr id="50" name="TextBox 49"/>
+          <p:cNvSpPr txBox="1"/>
+          <p:nvPr/>
+        </p:nvSpPr>
+        <p:spPr>
+          <a:xfrm>
+            <a:off x="3953002" y="1515868"/>
+            <a:ext cx="1315497" cy="369332"/>
+          </a:xfrm>
+          <a:prstGeom prst="rect">
+            <a:avLst/>
+          </a:prstGeom>
+          <a:noFill/>
+          <a:ln>
+            <a:noFill/>
+          </a:ln>
+        </p:spPr>
+        <p:txBody>
+          <a:bodyPr wrap="none" rtlCol="0">
+            <a:spAutoFit/>
+          </a:bodyPr>
+          <a:lstStyle/>
+          <a:p>
+            <a:r>
+              <a:rPr lang="en-US" dirty="0" smtClean="0"/>
+              <a:t>Cache line 2</a:t>
+            </a:r>
+            <a:endParaRPr lang="en-US" dirty="0"/>
+          </a:p>
+        </p:txBody>
+      </p:sp>
+      <p:cxnSp>
+        <p:nvCxnSpPr>
+          <p:cNvPr id="55" name="Straight Connector 54"/>
+          <p:cNvCxnSpPr/>
+          <p:nvPr/>
+        </p:nvCxnSpPr>
+        <p:spPr>
+          <a:xfrm rot="5400000">
+            <a:off x="803146" y="1747686"/>
+            <a:ext cx="304800" cy="1588"/>
+          </a:xfrm>
+          <a:prstGeom prst="line">
+            <a:avLst/>
+          </a:prstGeom>
+          <a:ln w="19050">
+            <a:solidFill>
+              <a:schemeClr val="tx1"/>
+            </a:solidFill>
+          </a:ln>
+        </p:spPr>
+        <p:style>
+          <a:lnRef idx="2">
+            <a:schemeClr val="accent1"/>
+          </a:lnRef>
+          <a:fillRef idx="0">
+            <a:schemeClr val="accent1"/>
+          </a:fillRef>
+          <a:effectRef idx="1">
+            <a:schemeClr val="accent1"/>
+          </a:effectRef>
+          <a:fontRef idx="minor">
+            <a:schemeClr val="tx1"/>
+          </a:fontRef>
+        </p:style>
+      </p:cxnSp>
       <p:grpSp>
         <p:nvGrpSpPr>
-          <p:cNvPr id="61" name="Group 60"/>
-          <p:cNvGrpSpPr/>
-          <p:nvPr/>
-        </p:nvGrpSpPr>
-        <p:grpSpPr>
-          <a:xfrm>
-            <a:off x="940662" y="386400"/>
-            <a:ext cx="4906880" cy="1514480"/>
-            <a:chOff x="940662" y="1280160"/>
-            <a:chExt cx="4906880" cy="1514480"/>
-          </a:xfrm>
-        </p:grpSpPr>
-        <p:sp>
-          <p:nvSpPr>
-            <p:cNvPr id="4" name="Rectangle 3"/>
-            <p:cNvSpPr/>
-            <p:nvPr/>
-          </p:nvSpPr>
-          <p:spPr>
-            <a:xfrm>
-              <a:off x="956340" y="1285753"/>
-              <a:ext cx="2430039" cy="1005840"/>
-            </a:xfrm>
-            <a:prstGeom prst="rect">
-              <a:avLst/>
-            </a:prstGeom>
-            <a:noFill/>
-            <a:ln w="19050">
-              <a:solidFill>
-                <a:schemeClr val="tx1">
-                  <a:lumMod val="95000"/>
-                  <a:lumOff val="5000"/>
-                </a:schemeClr>
-              </a:solidFill>
-            </a:ln>
-          </p:spPr>
-          <p:style>
-            <a:lnRef idx="1">
-              <a:schemeClr val="accent1"/>
-            </a:lnRef>
-            <a:fillRef idx="3">
-              <a:schemeClr val="accent1"/>
-            </a:fillRef>
-            <a:effectRef idx="2">
-              <a:schemeClr val="accent1"/>
-            </a:effectRef>
-            <a:fontRef idx="minor">
-              <a:schemeClr val="lt1"/>
-            </a:fontRef>
-          </p:style>
-          <p:txBody>
-            <a:bodyPr rtlCol="0" anchor="ctr"/>
-            <a:lstStyle/>
-            <a:p>
-              <a:pPr algn="ctr"/>
-              <a:endParaRPr lang="en-US" dirty="0"/>
-            </a:p>
-          </p:txBody>
-        </p:sp>
-        <p:cxnSp>
-          <p:nvCxnSpPr>
-            <p:cNvPr id="6" name="Straight Connector 5"/>
-            <p:cNvCxnSpPr/>
-            <p:nvPr/>
-          </p:nvCxnSpPr>
-          <p:spPr>
-            <a:xfrm rot="5400000" flipH="1" flipV="1">
-              <a:off x="955107" y="1289304"/>
-              <a:ext cx="1005839" cy="1003372"/>
-            </a:xfrm>
-            <a:prstGeom prst="line">
-              <a:avLst/>
-            </a:prstGeom>
-            <a:ln w="12700">
-              <a:solidFill>
-                <a:schemeClr val="tx1">
-                  <a:lumMod val="95000"/>
-                  <a:lumOff val="5000"/>
-                </a:schemeClr>
-              </a:solidFill>
-            </a:ln>
-          </p:spPr>
-          <p:style>
-            <a:lnRef idx="2">
-              <a:schemeClr val="accent1"/>
-            </a:lnRef>
-            <a:fillRef idx="0">
-              <a:schemeClr val="accent1"/>
-            </a:fillRef>
-            <a:effectRef idx="1">
-              <a:schemeClr val="accent1"/>
-            </a:effectRef>
-            <a:fontRef idx="minor">
-              <a:schemeClr val="tx1"/>
-            </a:fontRef>
-          </p:style>
-        </p:cxnSp>
-        <p:cxnSp>
-          <p:nvCxnSpPr>
-            <p:cNvPr id="8" name="Straight Connector 7"/>
-            <p:cNvCxnSpPr/>
-            <p:nvPr/>
-          </p:nvCxnSpPr>
-          <p:spPr>
-            <a:xfrm rot="5400000" flipH="1" flipV="1">
-              <a:off x="1226628" y="1289304"/>
-              <a:ext cx="1005839" cy="1003372"/>
-            </a:xfrm>
-            <a:prstGeom prst="line">
-              <a:avLst/>
-            </a:prstGeom>
-            <a:ln w="12700">
-              <a:solidFill>
-                <a:schemeClr val="tx1">
-                  <a:lumMod val="95000"/>
-                  <a:lumOff val="5000"/>
-                </a:schemeClr>
-              </a:solidFill>
-            </a:ln>
-          </p:spPr>
-          <p:style>
-            <a:lnRef idx="2">
-              <a:schemeClr val="accent1"/>
-            </a:lnRef>
-            <a:fillRef idx="0">
-              <a:schemeClr val="accent1"/>
-            </a:fillRef>
-            <a:effectRef idx="1">
-              <a:schemeClr val="accent1"/>
-            </a:effectRef>
-            <a:fontRef idx="minor">
-              <a:schemeClr val="tx1"/>
-            </a:fontRef>
-          </p:style>
-        </p:cxnSp>
-        <p:cxnSp>
-          <p:nvCxnSpPr>
-            <p:cNvPr id="9" name="Straight Connector 8"/>
-            <p:cNvCxnSpPr/>
-            <p:nvPr/>
-          </p:nvCxnSpPr>
-          <p:spPr>
-            <a:xfrm rot="5400000" flipH="1" flipV="1">
-              <a:off x="1500948" y="1293868"/>
-              <a:ext cx="1005839" cy="1003372"/>
-            </a:xfrm>
-            <a:prstGeom prst="line">
-              <a:avLst/>
-            </a:prstGeom>
-            <a:ln w="12700">
-              <a:solidFill>
-                <a:schemeClr val="tx1">
-                  <a:lumMod val="95000"/>
-                  <a:lumOff val="5000"/>
-                </a:schemeClr>
-              </a:solidFill>
-            </a:ln>
-          </p:spPr>
-          <p:style>
-            <a:lnRef idx="2">
-              <a:schemeClr val="accent1"/>
-            </a:lnRef>
-            <a:fillRef idx="0">
-              <a:schemeClr val="accent1"/>
-            </a:fillRef>
-            <a:effectRef idx="1">
-              <a:schemeClr val="accent1"/>
-            </a:effectRef>
-            <a:fontRef idx="minor">
-              <a:schemeClr val="tx1"/>
-            </a:fontRef>
-          </p:style>
-        </p:cxnSp>
-        <p:cxnSp>
-          <p:nvCxnSpPr>
-            <p:cNvPr id="10" name="Straight Connector 9"/>
-            <p:cNvCxnSpPr/>
-            <p:nvPr/>
-          </p:nvCxnSpPr>
-          <p:spPr>
-            <a:xfrm rot="5400000" flipH="1" flipV="1">
-              <a:off x="1775268" y="1289304"/>
-              <a:ext cx="1005839" cy="1003372"/>
-            </a:xfrm>
-            <a:prstGeom prst="line">
-              <a:avLst/>
-            </a:prstGeom>
-            <a:ln w="12700">
-              <a:solidFill>
-                <a:schemeClr val="tx1">
-                  <a:lumMod val="95000"/>
-                  <a:lumOff val="5000"/>
-                </a:schemeClr>
-              </a:solidFill>
-            </a:ln>
-          </p:spPr>
-          <p:style>
-            <a:lnRef idx="2">
-              <a:schemeClr val="accent1"/>
-            </a:lnRef>
-            <a:fillRef idx="0">
-              <a:schemeClr val="accent1"/>
-            </a:fillRef>
-            <a:effectRef idx="1">
-              <a:schemeClr val="accent1"/>
-            </a:effectRef>
-            <a:fontRef idx="minor">
-              <a:schemeClr val="tx1"/>
-            </a:fontRef>
-          </p:style>
-        </p:cxnSp>
-        <p:cxnSp>
-          <p:nvCxnSpPr>
-            <p:cNvPr id="11" name="Straight Connector 10"/>
-            <p:cNvCxnSpPr/>
-            <p:nvPr/>
-          </p:nvCxnSpPr>
-          <p:spPr>
-            <a:xfrm rot="5400000" flipH="1" flipV="1">
-              <a:off x="2049588" y="1289304"/>
-              <a:ext cx="1005839" cy="1003372"/>
-            </a:xfrm>
-            <a:prstGeom prst="line">
-              <a:avLst/>
-            </a:prstGeom>
-            <a:ln w="12700">
-              <a:solidFill>
-                <a:schemeClr val="tx1">
-                  <a:lumMod val="95000"/>
-                  <a:lumOff val="5000"/>
-                </a:schemeClr>
-              </a:solidFill>
-            </a:ln>
-          </p:spPr>
-          <p:style>
-            <a:lnRef idx="2">
-              <a:schemeClr val="accent1"/>
-            </a:lnRef>
-            <a:fillRef idx="0">
-              <a:schemeClr val="accent1"/>
-            </a:fillRef>
-            <a:effectRef idx="1">
-              <a:schemeClr val="accent1"/>
-            </a:effectRef>
-            <a:fontRef idx="minor">
-              <a:schemeClr val="tx1"/>
-            </a:fontRef>
-          </p:style>
-        </p:cxnSp>
-        <p:cxnSp>
-          <p:nvCxnSpPr>
-            <p:cNvPr id="12" name="Straight Connector 11"/>
-            <p:cNvCxnSpPr/>
-            <p:nvPr/>
-          </p:nvCxnSpPr>
-          <p:spPr>
-            <a:xfrm rot="5400000" flipH="1" flipV="1">
-              <a:off x="2323908" y="1289304"/>
-              <a:ext cx="1005839" cy="1003372"/>
-            </a:xfrm>
-            <a:prstGeom prst="line">
-              <a:avLst/>
-            </a:prstGeom>
-            <a:ln w="12700">
-              <a:solidFill>
-                <a:schemeClr val="tx1">
-                  <a:lumMod val="95000"/>
-                  <a:lumOff val="5000"/>
-                </a:schemeClr>
-              </a:solidFill>
-            </a:ln>
-          </p:spPr>
-          <p:style>
-            <a:lnRef idx="2">
-              <a:schemeClr val="accent1"/>
-            </a:lnRef>
-            <a:fillRef idx="0">
-              <a:schemeClr val="accent1"/>
-            </a:fillRef>
-            <a:effectRef idx="1">
-              <a:schemeClr val="accent1"/>
-            </a:effectRef>
-            <a:fontRef idx="minor">
-              <a:schemeClr val="tx1"/>
-            </a:fontRef>
-          </p:style>
-        </p:cxnSp>
-        <p:cxnSp>
-          <p:nvCxnSpPr>
-            <p:cNvPr id="13" name="Straight Connector 12"/>
-            <p:cNvCxnSpPr/>
-            <p:nvPr/>
-          </p:nvCxnSpPr>
-          <p:spPr>
-            <a:xfrm flipV="1">
-              <a:off x="2599462" y="1520951"/>
-              <a:ext cx="786919" cy="772959"/>
-            </a:xfrm>
-            <a:prstGeom prst="line">
-              <a:avLst/>
-            </a:prstGeom>
-            <a:ln w="12700">
-              <a:solidFill>
-                <a:schemeClr val="tx1">
-                  <a:lumMod val="95000"/>
-                  <a:lumOff val="5000"/>
-                </a:schemeClr>
-              </a:solidFill>
-            </a:ln>
-          </p:spPr>
-          <p:style>
-            <a:lnRef idx="2">
-              <a:schemeClr val="accent1"/>
-            </a:lnRef>
-            <a:fillRef idx="0">
-              <a:schemeClr val="accent1"/>
-            </a:fillRef>
-            <a:effectRef idx="1">
-              <a:schemeClr val="accent1"/>
-            </a:effectRef>
-            <a:fontRef idx="minor">
-              <a:schemeClr val="tx1"/>
-            </a:fontRef>
-          </p:style>
-        </p:cxnSp>
-        <p:cxnSp>
-          <p:nvCxnSpPr>
-            <p:cNvPr id="14" name="Straight Connector 13"/>
-            <p:cNvCxnSpPr/>
-            <p:nvPr/>
-          </p:nvCxnSpPr>
-          <p:spPr>
-            <a:xfrm rot="5400000" flipH="1" flipV="1">
-              <a:off x="953057" y="1286957"/>
-              <a:ext cx="723357" cy="716787"/>
-            </a:xfrm>
-            <a:prstGeom prst="line">
-              <a:avLst/>
-            </a:prstGeom>
-            <a:ln w="12700">
-              <a:solidFill>
-                <a:schemeClr val="tx1">
-                  <a:lumMod val="95000"/>
-                  <a:lumOff val="5000"/>
-                </a:schemeClr>
-              </a:solidFill>
-            </a:ln>
-          </p:spPr>
-          <p:style>
-            <a:lnRef idx="2">
-              <a:schemeClr val="accent1"/>
-            </a:lnRef>
-            <a:fillRef idx="0">
-              <a:schemeClr val="accent1"/>
-            </a:fillRef>
-            <a:effectRef idx="1">
-              <a:schemeClr val="accent1"/>
-            </a:effectRef>
-            <a:fontRef idx="minor">
-              <a:schemeClr val="tx1"/>
-            </a:fontRef>
-          </p:style>
-        </p:cxnSp>
-        <p:cxnSp>
-          <p:nvCxnSpPr>
-            <p:cNvPr id="24" name="Straight Connector 23"/>
-            <p:cNvCxnSpPr/>
-            <p:nvPr/>
-          </p:nvCxnSpPr>
-          <p:spPr>
-            <a:xfrm flipV="1">
-              <a:off x="940662" y="1292634"/>
-              <a:ext cx="462064" cy="397798"/>
-            </a:xfrm>
-            <a:prstGeom prst="line">
-              <a:avLst/>
-            </a:prstGeom>
-            <a:ln w="12700">
-              <a:solidFill>
-                <a:schemeClr val="tx1">
-                  <a:lumMod val="95000"/>
-                  <a:lumOff val="5000"/>
-                </a:schemeClr>
-              </a:solidFill>
-            </a:ln>
-          </p:spPr>
-          <p:style>
-            <a:lnRef idx="2">
-              <a:schemeClr val="accent1"/>
-            </a:lnRef>
-            <a:fillRef idx="0">
-              <a:schemeClr val="accent1"/>
-            </a:fillRef>
-            <a:effectRef idx="1">
-              <a:schemeClr val="accent1"/>
-            </a:effectRef>
-            <a:fontRef idx="minor">
-              <a:schemeClr val="tx1"/>
-            </a:fontRef>
-          </p:style>
-        </p:cxnSp>
-        <p:cxnSp>
-          <p:nvCxnSpPr>
-            <p:cNvPr id="28" name="Straight Connector 27"/>
-            <p:cNvCxnSpPr>
-              <a:cxnSpLocks noChangeAspect="1"/>
-            </p:cNvCxnSpPr>
-            <p:nvPr/>
-          </p:nvCxnSpPr>
-          <p:spPr>
-            <a:xfrm flipV="1">
-              <a:off x="2950938" y="1830157"/>
-              <a:ext cx="453268" cy="445225"/>
-            </a:xfrm>
-            <a:prstGeom prst="line">
-              <a:avLst/>
-            </a:prstGeom>
-            <a:ln w="12700">
-              <a:solidFill>
-                <a:schemeClr val="tx1">
-                  <a:lumMod val="95000"/>
-                  <a:lumOff val="5000"/>
-                </a:schemeClr>
-              </a:solidFill>
-            </a:ln>
-          </p:spPr>
-          <p:style>
-            <a:lnRef idx="2">
-              <a:schemeClr val="accent1"/>
-            </a:lnRef>
-            <a:fillRef idx="0">
-              <a:schemeClr val="accent1"/>
-            </a:fillRef>
-            <a:effectRef idx="1">
-              <a:schemeClr val="accent1"/>
-            </a:effectRef>
-            <a:fontRef idx="minor">
-              <a:schemeClr val="tx1"/>
-            </a:fontRef>
-          </p:style>
-        </p:cxnSp>
-        <p:sp>
-          <p:nvSpPr>
-            <p:cNvPr id="32" name="Rectangle 31"/>
-            <p:cNvSpPr/>
-            <p:nvPr/>
-          </p:nvSpPr>
-          <p:spPr>
-            <a:xfrm flipH="1">
-              <a:off x="3394373" y="1282241"/>
-              <a:ext cx="2432304" cy="1005840"/>
-            </a:xfrm>
-            <a:prstGeom prst="rect">
-              <a:avLst/>
-            </a:prstGeom>
-            <a:noFill/>
-            <a:ln w="19050">
-              <a:solidFill>
-                <a:schemeClr val="tx1">
-                  <a:lumMod val="95000"/>
-                  <a:lumOff val="5000"/>
-                </a:schemeClr>
-              </a:solidFill>
-            </a:ln>
-          </p:spPr>
-          <p:style>
-            <a:lnRef idx="1">
-              <a:schemeClr val="accent1"/>
-            </a:lnRef>
-            <a:fillRef idx="3">
-              <a:schemeClr val="accent1"/>
-            </a:fillRef>
-            <a:effectRef idx="2">
-              <a:schemeClr val="accent1"/>
-            </a:effectRef>
-            <a:fontRef idx="minor">
-              <a:schemeClr val="lt1"/>
-            </a:fontRef>
-          </p:style>
-          <p:txBody>
-            <a:bodyPr rtlCol="0" anchor="ctr"/>
-            <a:lstStyle/>
-            <a:p>
-              <a:pPr algn="ctr"/>
-              <a:endParaRPr lang="en-US" dirty="0"/>
-            </a:p>
-          </p:txBody>
-        </p:sp>
-        <p:cxnSp>
-          <p:nvCxnSpPr>
-            <p:cNvPr id="33" name="Straight Connector 32"/>
-            <p:cNvCxnSpPr/>
-            <p:nvPr/>
-          </p:nvCxnSpPr>
-          <p:spPr>
-            <a:xfrm rot="16200000" flipV="1">
-              <a:off x="4816826" y="1286567"/>
-              <a:ext cx="1005839" cy="1001821"/>
-            </a:xfrm>
-            <a:prstGeom prst="line">
-              <a:avLst/>
-            </a:prstGeom>
-            <a:ln w="12700">
-              <a:solidFill>
-                <a:schemeClr val="tx1">
-                  <a:lumMod val="95000"/>
-                  <a:lumOff val="5000"/>
-                </a:schemeClr>
-              </a:solidFill>
-            </a:ln>
-          </p:spPr>
-          <p:style>
-            <a:lnRef idx="2">
-              <a:schemeClr val="accent1"/>
-            </a:lnRef>
-            <a:fillRef idx="0">
-              <a:schemeClr val="accent1"/>
-            </a:fillRef>
-            <a:effectRef idx="1">
-              <a:schemeClr val="accent1"/>
-            </a:effectRef>
-            <a:fontRef idx="minor">
-              <a:schemeClr val="tx1"/>
-            </a:fontRef>
-          </p:style>
-        </p:cxnSp>
-        <p:cxnSp>
-          <p:nvCxnSpPr>
-            <p:cNvPr id="34" name="Straight Connector 33"/>
-            <p:cNvCxnSpPr/>
-            <p:nvPr/>
-          </p:nvCxnSpPr>
-          <p:spPr>
-            <a:xfrm rot="16200000" flipV="1">
-              <a:off x="4545724" y="1286567"/>
-              <a:ext cx="1005839" cy="1001821"/>
-            </a:xfrm>
-            <a:prstGeom prst="line">
-              <a:avLst/>
-            </a:prstGeom>
-            <a:ln w="12700">
-              <a:solidFill>
-                <a:schemeClr val="tx1">
-                  <a:lumMod val="95000"/>
-                  <a:lumOff val="5000"/>
-                </a:schemeClr>
-              </a:solidFill>
-            </a:ln>
-          </p:spPr>
-          <p:style>
-            <a:lnRef idx="2">
-              <a:schemeClr val="accent1"/>
-            </a:lnRef>
-            <a:fillRef idx="0">
-              <a:schemeClr val="accent1"/>
-            </a:fillRef>
-            <a:effectRef idx="1">
-              <a:schemeClr val="accent1"/>
-            </a:effectRef>
-            <a:fontRef idx="minor">
-              <a:schemeClr val="tx1"/>
-            </a:fontRef>
-          </p:style>
-        </p:cxnSp>
-        <p:cxnSp>
-          <p:nvCxnSpPr>
-            <p:cNvPr id="35" name="Straight Connector 34"/>
-            <p:cNvCxnSpPr/>
-            <p:nvPr/>
-          </p:nvCxnSpPr>
-          <p:spPr>
-            <a:xfrm rot="16200000" flipV="1">
-              <a:off x="4271828" y="1291131"/>
-              <a:ext cx="1005839" cy="1001821"/>
-            </a:xfrm>
-            <a:prstGeom prst="line">
-              <a:avLst/>
-            </a:prstGeom>
-            <a:ln w="12700">
-              <a:solidFill>
-                <a:schemeClr val="tx1">
-                  <a:lumMod val="95000"/>
-                  <a:lumOff val="5000"/>
-                </a:schemeClr>
-              </a:solidFill>
-            </a:ln>
-          </p:spPr>
-          <p:style>
-            <a:lnRef idx="2">
-              <a:schemeClr val="accent1"/>
-            </a:lnRef>
-            <a:fillRef idx="0">
-              <a:schemeClr val="accent1"/>
-            </a:fillRef>
-            <a:effectRef idx="1">
-              <a:schemeClr val="accent1"/>
-            </a:effectRef>
-            <a:fontRef idx="minor">
-              <a:schemeClr val="tx1"/>
-            </a:fontRef>
-          </p:style>
-        </p:cxnSp>
-        <p:cxnSp>
-          <p:nvCxnSpPr>
-            <p:cNvPr id="36" name="Straight Connector 35"/>
-            <p:cNvCxnSpPr/>
-            <p:nvPr/>
-          </p:nvCxnSpPr>
-          <p:spPr>
-            <a:xfrm rot="16200000" flipV="1">
-              <a:off x="3997932" y="1286567"/>
-              <a:ext cx="1005839" cy="1001821"/>
-            </a:xfrm>
-            <a:prstGeom prst="line">
-              <a:avLst/>
-            </a:prstGeom>
-            <a:ln w="12700">
-              <a:solidFill>
-                <a:schemeClr val="tx1">
-                  <a:lumMod val="95000"/>
-                  <a:lumOff val="5000"/>
-                </a:schemeClr>
-              </a:solidFill>
-            </a:ln>
-          </p:spPr>
-          <p:style>
-            <a:lnRef idx="2">
-              <a:schemeClr val="accent1"/>
-            </a:lnRef>
-            <a:fillRef idx="0">
-              <a:schemeClr val="accent1"/>
-            </a:fillRef>
-            <a:effectRef idx="1">
-              <a:schemeClr val="accent1"/>
-            </a:effectRef>
-            <a:fontRef idx="minor">
-              <a:schemeClr val="tx1"/>
-            </a:fontRef>
-          </p:style>
-        </p:cxnSp>
-        <p:cxnSp>
-          <p:nvCxnSpPr>
-            <p:cNvPr id="37" name="Straight Connector 36"/>
-            <p:cNvCxnSpPr/>
-            <p:nvPr/>
-          </p:nvCxnSpPr>
-          <p:spPr>
-            <a:xfrm rot="16200000" flipV="1">
-              <a:off x="3724036" y="1286567"/>
-              <a:ext cx="1005839" cy="1001821"/>
-            </a:xfrm>
-            <a:prstGeom prst="line">
-              <a:avLst/>
-            </a:prstGeom>
-            <a:ln w="12700">
-              <a:solidFill>
-                <a:schemeClr val="tx1">
-                  <a:lumMod val="95000"/>
-                  <a:lumOff val="5000"/>
-                </a:schemeClr>
-              </a:solidFill>
-            </a:ln>
-          </p:spPr>
-          <p:style>
-            <a:lnRef idx="2">
-              <a:schemeClr val="accent1"/>
-            </a:lnRef>
-            <a:fillRef idx="0">
-              <a:schemeClr val="accent1"/>
-            </a:fillRef>
-            <a:effectRef idx="1">
-              <a:schemeClr val="accent1"/>
-            </a:effectRef>
-            <a:fontRef idx="minor">
-              <a:schemeClr val="tx1"/>
-            </a:fontRef>
-          </p:style>
-        </p:cxnSp>
-        <p:cxnSp>
-          <p:nvCxnSpPr>
-            <p:cNvPr id="38" name="Straight Connector 37"/>
-            <p:cNvCxnSpPr/>
-            <p:nvPr/>
-          </p:nvCxnSpPr>
-          <p:spPr>
-            <a:xfrm rot="16200000" flipV="1">
-              <a:off x="3450141" y="1286567"/>
-              <a:ext cx="1005839" cy="1001821"/>
-            </a:xfrm>
-            <a:prstGeom prst="line">
-              <a:avLst/>
-            </a:prstGeom>
-            <a:ln w="12700">
-              <a:solidFill>
-                <a:schemeClr val="tx1">
-                  <a:lumMod val="95000"/>
-                  <a:lumOff val="5000"/>
-                </a:schemeClr>
-              </a:solidFill>
-            </a:ln>
-          </p:spPr>
-          <p:style>
-            <a:lnRef idx="2">
-              <a:schemeClr val="accent1"/>
-            </a:lnRef>
-            <a:fillRef idx="0">
-              <a:schemeClr val="accent1"/>
-            </a:fillRef>
-            <a:effectRef idx="1">
-              <a:schemeClr val="accent1"/>
-            </a:effectRef>
-            <a:fontRef idx="minor">
-              <a:schemeClr val="tx1"/>
-            </a:fontRef>
-          </p:style>
-        </p:cxnSp>
-        <p:cxnSp>
-          <p:nvCxnSpPr>
-            <p:cNvPr id="39" name="Straight Connector 38"/>
-            <p:cNvCxnSpPr/>
-            <p:nvPr/>
-          </p:nvCxnSpPr>
-          <p:spPr>
-            <a:xfrm flipH="1" flipV="1">
-              <a:off x="3394371" y="1517439"/>
-              <a:ext cx="785703" cy="772959"/>
-            </a:xfrm>
-            <a:prstGeom prst="line">
-              <a:avLst/>
-            </a:prstGeom>
-            <a:ln w="12700">
-              <a:solidFill>
-                <a:schemeClr val="tx1">
-                  <a:lumMod val="95000"/>
-                  <a:lumOff val="5000"/>
-                </a:schemeClr>
-              </a:solidFill>
-            </a:ln>
-          </p:spPr>
-          <p:style>
-            <a:lnRef idx="2">
-              <a:schemeClr val="accent1"/>
-            </a:lnRef>
-            <a:fillRef idx="0">
-              <a:schemeClr val="accent1"/>
-            </a:fillRef>
-            <a:effectRef idx="1">
-              <a:schemeClr val="accent1"/>
-            </a:effectRef>
-            <a:fontRef idx="minor">
-              <a:schemeClr val="tx1"/>
-            </a:fontRef>
-          </p:style>
-        </p:cxnSp>
-        <p:cxnSp>
-          <p:nvCxnSpPr>
-            <p:cNvPr id="40" name="Straight Connector 39"/>
-            <p:cNvCxnSpPr/>
-            <p:nvPr/>
-          </p:nvCxnSpPr>
-          <p:spPr>
-            <a:xfrm rot="16200000" flipV="1">
-              <a:off x="5101136" y="1283999"/>
-              <a:ext cx="723357" cy="715679"/>
-            </a:xfrm>
-            <a:prstGeom prst="line">
-              <a:avLst/>
-            </a:prstGeom>
-            <a:ln w="12700">
-              <a:solidFill>
-                <a:schemeClr val="tx1">
-                  <a:lumMod val="95000"/>
-                  <a:lumOff val="5000"/>
-                </a:schemeClr>
-              </a:solidFill>
-            </a:ln>
-          </p:spPr>
-          <p:style>
-            <a:lnRef idx="2">
-              <a:schemeClr val="accent1"/>
-            </a:lnRef>
-            <a:fillRef idx="0">
-              <a:schemeClr val="accent1"/>
-            </a:fillRef>
-            <a:effectRef idx="1">
-              <a:schemeClr val="accent1"/>
-            </a:effectRef>
-            <a:fontRef idx="minor">
-              <a:schemeClr val="tx1"/>
-            </a:fontRef>
-          </p:style>
-        </p:cxnSp>
-        <p:cxnSp>
-          <p:nvCxnSpPr>
-            <p:cNvPr id="41" name="Straight Connector 40"/>
-            <p:cNvCxnSpPr/>
-            <p:nvPr/>
-          </p:nvCxnSpPr>
-          <p:spPr>
-            <a:xfrm flipH="1" flipV="1">
-              <a:off x="5374960" y="1289122"/>
-              <a:ext cx="461350" cy="397798"/>
-            </a:xfrm>
-            <a:prstGeom prst="line">
-              <a:avLst/>
-            </a:prstGeom>
-            <a:ln w="12700">
-              <a:solidFill>
-                <a:schemeClr val="tx1">
-                  <a:lumMod val="95000"/>
-                  <a:lumOff val="5000"/>
-                </a:schemeClr>
-              </a:solidFill>
-            </a:ln>
-          </p:spPr>
-          <p:style>
-            <a:lnRef idx="2">
-              <a:schemeClr val="accent1"/>
-            </a:lnRef>
-            <a:fillRef idx="0">
-              <a:schemeClr val="accent1"/>
-            </a:fillRef>
-            <a:effectRef idx="1">
-              <a:schemeClr val="accent1"/>
-            </a:effectRef>
-            <a:fontRef idx="minor">
-              <a:schemeClr val="tx1"/>
-            </a:fontRef>
-          </p:style>
-        </p:cxnSp>
-        <p:cxnSp>
-          <p:nvCxnSpPr>
-            <p:cNvPr id="42" name="Straight Connector 41"/>
-            <p:cNvCxnSpPr>
-              <a:cxnSpLocks noChangeAspect="1"/>
-            </p:cNvCxnSpPr>
-            <p:nvPr/>
-          </p:nvCxnSpPr>
-          <p:spPr>
-            <a:xfrm flipH="1" flipV="1">
-              <a:off x="3376574" y="1826645"/>
-              <a:ext cx="452567" cy="445225"/>
-            </a:xfrm>
-            <a:prstGeom prst="line">
-              <a:avLst/>
-            </a:prstGeom>
-            <a:ln w="12700">
-              <a:solidFill>
-                <a:schemeClr val="tx1">
-                  <a:lumMod val="95000"/>
-                  <a:lumOff val="5000"/>
-                </a:schemeClr>
-              </a:solidFill>
-            </a:ln>
-          </p:spPr>
-          <p:style>
-            <a:lnRef idx="2">
-              <a:schemeClr val="accent1"/>
-            </a:lnRef>
-            <a:fillRef idx="0">
-              <a:schemeClr val="accent1"/>
-            </a:fillRef>
-            <a:effectRef idx="1">
-              <a:schemeClr val="accent1"/>
-            </a:effectRef>
-            <a:fontRef idx="minor">
-              <a:schemeClr val="tx1"/>
-            </a:fontRef>
-          </p:style>
-        </p:cxnSp>
-        <p:cxnSp>
-          <p:nvCxnSpPr>
-            <p:cNvPr id="46" name="Straight Connector 45"/>
-            <p:cNvCxnSpPr/>
-            <p:nvPr/>
-          </p:nvCxnSpPr>
-          <p:spPr>
-            <a:xfrm rot="5400000">
-              <a:off x="3227183" y="2641446"/>
-              <a:ext cx="304800" cy="1588"/>
-            </a:xfrm>
-            <a:prstGeom prst="line">
-              <a:avLst/>
-            </a:prstGeom>
-            <a:ln w="19050">
-              <a:solidFill>
-                <a:schemeClr val="tx1"/>
-              </a:solidFill>
-            </a:ln>
-          </p:spPr>
-          <p:style>
-            <a:lnRef idx="2">
-              <a:schemeClr val="accent1"/>
-            </a:lnRef>
-            <a:fillRef idx="0">
-              <a:schemeClr val="accent1"/>
-            </a:fillRef>
-            <a:effectRef idx="1">
-              <a:schemeClr val="accent1"/>
-            </a:effectRef>
-            <a:fontRef idx="minor">
-              <a:schemeClr val="tx1"/>
-            </a:fontRef>
-          </p:style>
-        </p:cxnSp>
-        <p:cxnSp>
-          <p:nvCxnSpPr>
-            <p:cNvPr id="47" name="Straight Connector 46"/>
-            <p:cNvCxnSpPr/>
-            <p:nvPr/>
-          </p:nvCxnSpPr>
-          <p:spPr>
-            <a:xfrm rot="5400000">
-              <a:off x="5678470" y="2625766"/>
-              <a:ext cx="304800" cy="1588"/>
-            </a:xfrm>
-            <a:prstGeom prst="line">
-              <a:avLst/>
-            </a:prstGeom>
-            <a:ln w="19050">
-              <a:solidFill>
-                <a:schemeClr val="tx1"/>
-              </a:solidFill>
-            </a:ln>
-          </p:spPr>
-          <p:style>
-            <a:lnRef idx="2">
-              <a:schemeClr val="accent1"/>
-            </a:lnRef>
-            <a:fillRef idx="0">
-              <a:schemeClr val="accent1"/>
-            </a:fillRef>
-            <a:effectRef idx="1">
-              <a:schemeClr val="accent1"/>
-            </a:effectRef>
-            <a:fontRef idx="minor">
-              <a:schemeClr val="tx1"/>
-            </a:fontRef>
-          </p:style>
-        </p:cxnSp>
-        <p:cxnSp>
-          <p:nvCxnSpPr>
-            <p:cNvPr id="48" name="Straight Connector 47"/>
-            <p:cNvCxnSpPr/>
-            <p:nvPr/>
-          </p:nvCxnSpPr>
-          <p:spPr>
-            <a:xfrm flipV="1">
-              <a:off x="946358" y="2781940"/>
-              <a:ext cx="4901184" cy="12700"/>
-            </a:xfrm>
-            <a:prstGeom prst="line">
-              <a:avLst/>
-            </a:prstGeom>
-            <a:ln w="19050">
-              <a:solidFill>
-                <a:schemeClr val="tx1"/>
-              </a:solidFill>
-            </a:ln>
-          </p:spPr>
-          <p:style>
-            <a:lnRef idx="2">
-              <a:schemeClr val="accent1"/>
-            </a:lnRef>
-            <a:fillRef idx="0">
-              <a:schemeClr val="accent1"/>
-            </a:fillRef>
-            <a:effectRef idx="1">
-              <a:schemeClr val="accent1"/>
-            </a:effectRef>
-            <a:fontRef idx="minor">
-              <a:schemeClr val="tx1"/>
-            </a:fontRef>
-          </p:style>
-        </p:cxnSp>
-        <p:sp>
-          <p:nvSpPr>
-            <p:cNvPr id="49" name="TextBox 48"/>
-            <p:cNvSpPr txBox="1"/>
-            <p:nvPr/>
-          </p:nvSpPr>
-          <p:spPr>
-            <a:xfrm>
-              <a:off x="1517859" y="2409628"/>
-              <a:ext cx="1315497" cy="369332"/>
-            </a:xfrm>
-            <a:prstGeom prst="rect">
-              <a:avLst/>
-            </a:prstGeom>
-            <a:noFill/>
-            <a:ln>
-              <a:noFill/>
-            </a:ln>
-          </p:spPr>
-          <p:txBody>
-            <a:bodyPr wrap="none" rtlCol="0">
-              <a:spAutoFit/>
-            </a:bodyPr>
-            <a:lstStyle/>
-            <a:p>
-              <a:r>
-                <a:rPr lang="en-US" dirty="0" smtClean="0"/>
-                <a:t>Cache line 1</a:t>
-              </a:r>
-              <a:endParaRPr lang="en-US" dirty="0"/>
-            </a:p>
-          </p:txBody>
-        </p:sp>
-        <p:sp>
-          <p:nvSpPr>
-            <p:cNvPr id="50" name="TextBox 49"/>
-            <p:cNvSpPr txBox="1"/>
-            <p:nvPr/>
-          </p:nvSpPr>
-          <p:spPr>
-            <a:xfrm>
-              <a:off x="3953002" y="2409628"/>
-              <a:ext cx="1315497" cy="369332"/>
-            </a:xfrm>
-            <a:prstGeom prst="rect">
-              <a:avLst/>
-            </a:prstGeom>
-            <a:noFill/>
-            <a:ln>
-              <a:noFill/>
-            </a:ln>
-          </p:spPr>
-          <p:txBody>
-            <a:bodyPr wrap="none" rtlCol="0">
-              <a:spAutoFit/>
-            </a:bodyPr>
-            <a:lstStyle/>
-            <a:p>
-              <a:r>
-                <a:rPr lang="en-US" dirty="0" smtClean="0"/>
-                <a:t>Cache line 2</a:t>
-              </a:r>
-              <a:endParaRPr lang="en-US" dirty="0"/>
-            </a:p>
-          </p:txBody>
-        </p:sp>
-        <p:cxnSp>
-          <p:nvCxnSpPr>
-            <p:cNvPr id="55" name="Straight Connector 54"/>
-            <p:cNvCxnSpPr/>
-            <p:nvPr/>
-          </p:nvCxnSpPr>
-          <p:spPr>
-            <a:xfrm rot="5400000">
-              <a:off x="803146" y="2641446"/>
-              <a:ext cx="304800" cy="1588"/>
-            </a:xfrm>
-            <a:prstGeom prst="line">
-              <a:avLst/>
-            </a:prstGeom>
-            <a:ln w="19050">
-              <a:solidFill>
-                <a:schemeClr val="tx1"/>
-              </a:solidFill>
-            </a:ln>
-          </p:spPr>
-          <p:style>
-            <a:lnRef idx="2">
-              <a:schemeClr val="accent1"/>
-            </a:lnRef>
-            <a:fillRef idx="0">
-              <a:schemeClr val="accent1"/>
-            </a:fillRef>
-            <a:effectRef idx="1">
-              <a:schemeClr val="accent1"/>
-            </a:effectRef>
-            <a:fontRef idx="minor">
-              <a:schemeClr val="tx1"/>
-            </a:fontRef>
-          </p:style>
-        </p:cxnSp>
-      </p:grpSp>
-      <p:grpSp>
-        <p:nvGrpSpPr>
-          <p:cNvPr id="91" name="Group 90"/>
+          <p:cNvPr id="92" name="Group 91"/>
           <p:cNvGrpSpPr/>
           <p:nvPr/>
         </p:nvGrpSpPr>
         <p:grpSpPr>
           <a:xfrm>
             <a:off x="913776" y="2330485"/>
-            <a:ext cx="4906880" cy="1514480"/>
-            <a:chOff x="936282" y="3298480"/>
-            <a:chExt cx="4906880" cy="1514480"/>
+            <a:ext cx="4897736" cy="1514480"/>
+            <a:chOff x="913776" y="2330485"/>
+            <a:chExt cx="4897736" cy="1514480"/>
           </a:xfrm>
         </p:grpSpPr>
         <p:sp>
@@ -4559,7 +5689,7 @@
           </p:nvSpPr>
           <p:spPr>
             <a:xfrm>
-              <a:off x="951960" y="3304073"/>
+              <a:off x="929454" y="2340864"/>
               <a:ext cx="2430039" cy="1005840"/>
             </a:xfrm>
             <a:prstGeom prst="rect">
@@ -4606,7 +5736,7 @@
           </p:nvCxnSpPr>
           <p:spPr>
             <a:xfrm rot="5400000" flipH="1" flipV="1">
-              <a:off x="950727" y="3307624"/>
+              <a:off x="928221" y="2339629"/>
               <a:ext cx="1005839" cy="1003372"/>
             </a:xfrm>
             <a:prstGeom prst="line">
@@ -4644,7 +5774,7 @@
           </p:nvCxnSpPr>
           <p:spPr>
             <a:xfrm rot="5400000" flipH="1" flipV="1">
-              <a:off x="1222248" y="3307624"/>
+              <a:off x="1199742" y="2339629"/>
               <a:ext cx="1005839" cy="1003372"/>
             </a:xfrm>
             <a:prstGeom prst="line">
@@ -4682,7 +5812,7 @@
           </p:nvCxnSpPr>
           <p:spPr>
             <a:xfrm rot="5400000" flipH="1" flipV="1">
-              <a:off x="1496568" y="3312188"/>
+              <a:off x="1474062" y="2344193"/>
               <a:ext cx="1005839" cy="1003372"/>
             </a:xfrm>
             <a:prstGeom prst="line">
@@ -4720,7 +5850,7 @@
           </p:nvCxnSpPr>
           <p:spPr>
             <a:xfrm rot="5400000" flipH="1" flipV="1">
-              <a:off x="1770888" y="3307624"/>
+              <a:off x="1748382" y="2339629"/>
               <a:ext cx="1005839" cy="1003372"/>
             </a:xfrm>
             <a:prstGeom prst="line">
@@ -4758,7 +5888,7 @@
           </p:nvCxnSpPr>
           <p:spPr>
             <a:xfrm rot="5400000" flipH="1" flipV="1">
-              <a:off x="2045208" y="3307624"/>
+              <a:off x="2022702" y="2339629"/>
               <a:ext cx="1005839" cy="1003372"/>
             </a:xfrm>
             <a:prstGeom prst="line">
@@ -4796,7 +5926,7 @@
           </p:nvCxnSpPr>
           <p:spPr>
             <a:xfrm rot="5400000" flipH="1" flipV="1">
-              <a:off x="2319528" y="3307624"/>
+              <a:off x="2297022" y="2339629"/>
               <a:ext cx="1005839" cy="1003372"/>
             </a:xfrm>
             <a:prstGeom prst="line">
@@ -4834,7 +5964,7 @@
           </p:nvCxnSpPr>
           <p:spPr>
             <a:xfrm flipV="1">
-              <a:off x="2595082" y="3539271"/>
+              <a:off x="2572576" y="2571276"/>
               <a:ext cx="786919" cy="772959"/>
             </a:xfrm>
             <a:prstGeom prst="line">
@@ -4872,7 +6002,7 @@
           </p:nvCxnSpPr>
           <p:spPr>
             <a:xfrm rot="5400000" flipH="1" flipV="1">
-              <a:off x="948677" y="3305277"/>
+              <a:off x="926171" y="2337282"/>
               <a:ext cx="723357" cy="716787"/>
             </a:xfrm>
             <a:prstGeom prst="line">
@@ -4910,7 +6040,7 @@
           </p:nvCxnSpPr>
           <p:spPr>
             <a:xfrm flipV="1">
-              <a:off x="936282" y="3310954"/>
+              <a:off x="913776" y="2342959"/>
               <a:ext cx="462064" cy="397798"/>
             </a:xfrm>
             <a:prstGeom prst="line">
@@ -4950,7 +6080,7 @@
           </p:nvCxnSpPr>
           <p:spPr>
             <a:xfrm flipV="1">
-              <a:off x="2946558" y="3848477"/>
+              <a:off x="2924052" y="2880482"/>
               <a:ext cx="453268" cy="445225"/>
             </a:xfrm>
             <a:prstGeom prst="line">
@@ -4988,7 +6118,7 @@
           </p:nvSpPr>
           <p:spPr>
             <a:xfrm flipH="1">
-              <a:off x="3389993" y="3300561"/>
+              <a:off x="3367487" y="2340864"/>
               <a:ext cx="2432304" cy="1005840"/>
             </a:xfrm>
             <a:prstGeom prst="rect">
@@ -5035,7 +6165,7 @@
           </p:nvCxnSpPr>
           <p:spPr>
             <a:xfrm rot="16200000" flipV="1">
-              <a:off x="4812446" y="3304887"/>
+              <a:off x="4789940" y="2336892"/>
               <a:ext cx="1005839" cy="1001821"/>
             </a:xfrm>
             <a:prstGeom prst="line">
@@ -5073,7 +6203,7 @@
           </p:nvCxnSpPr>
           <p:spPr>
             <a:xfrm rot="16200000" flipV="1">
-              <a:off x="4541344" y="3304887"/>
+              <a:off x="4518838" y="2336892"/>
               <a:ext cx="1005839" cy="1001821"/>
             </a:xfrm>
             <a:prstGeom prst="line">
@@ -5111,7 +6241,7 @@
           </p:nvCxnSpPr>
           <p:spPr>
             <a:xfrm rot="16200000" flipV="1">
-              <a:off x="4267448" y="3309451"/>
+              <a:off x="4244942" y="2341456"/>
               <a:ext cx="1005839" cy="1001821"/>
             </a:xfrm>
             <a:prstGeom prst="line">
@@ -5149,7 +6279,7 @@
           </p:nvCxnSpPr>
           <p:spPr>
             <a:xfrm rot="16200000" flipV="1">
-              <a:off x="3993552" y="3304887"/>
+              <a:off x="3971046" y="2336892"/>
               <a:ext cx="1005839" cy="1001821"/>
             </a:xfrm>
             <a:prstGeom prst="line">
@@ -5187,7 +6317,7 @@
           </p:nvCxnSpPr>
           <p:spPr>
             <a:xfrm rot="16200000" flipV="1">
-              <a:off x="3719656" y="3304887"/>
+              <a:off x="3697150" y="2336892"/>
               <a:ext cx="1005839" cy="1001821"/>
             </a:xfrm>
             <a:prstGeom prst="line">
@@ -5225,7 +6355,7 @@
           </p:nvCxnSpPr>
           <p:spPr>
             <a:xfrm rot="16200000" flipV="1">
-              <a:off x="3445761" y="3304887"/>
+              <a:off x="3423255" y="2336892"/>
               <a:ext cx="1005839" cy="1001821"/>
             </a:xfrm>
             <a:prstGeom prst="line">
@@ -5263,7 +6393,7 @@
           </p:nvCxnSpPr>
           <p:spPr>
             <a:xfrm flipH="1" flipV="1">
-              <a:off x="3389991" y="3535759"/>
+              <a:off x="3367485" y="2567764"/>
               <a:ext cx="785703" cy="772959"/>
             </a:xfrm>
             <a:prstGeom prst="line">
@@ -5301,7 +6431,7 @@
           </p:nvCxnSpPr>
           <p:spPr>
             <a:xfrm rot="16200000" flipV="1">
-              <a:off x="5096756" y="3302319"/>
+              <a:off x="5074250" y="2334324"/>
               <a:ext cx="723357" cy="715679"/>
             </a:xfrm>
             <a:prstGeom prst="line">
@@ -5339,7 +6469,7 @@
           </p:nvCxnSpPr>
           <p:spPr>
             <a:xfrm flipH="1" flipV="1">
-              <a:off x="5370580" y="3307442"/>
+              <a:off x="5348074" y="2339447"/>
               <a:ext cx="461350" cy="397798"/>
             </a:xfrm>
             <a:prstGeom prst="line">
@@ -5379,7 +6509,7 @@
           </p:nvCxnSpPr>
           <p:spPr>
             <a:xfrm flipH="1" flipV="1">
-              <a:off x="3372194" y="3844965"/>
+              <a:off x="3349688" y="2876970"/>
               <a:ext cx="452567" cy="445225"/>
             </a:xfrm>
             <a:prstGeom prst="line">
@@ -5417,7 +6547,7 @@
           </p:nvCxnSpPr>
           <p:spPr>
             <a:xfrm rot="5400000">
-              <a:off x="5674090" y="4644086"/>
+              <a:off x="5651584" y="3676091"/>
               <a:ext cx="304800" cy="1588"/>
             </a:xfrm>
             <a:prstGeom prst="line">
@@ -5452,8 +6582,8 @@
           </p:nvCxnSpPr>
           <p:spPr>
             <a:xfrm flipV="1">
-              <a:off x="941978" y="4800260"/>
-              <a:ext cx="4901184" cy="12700"/>
+              <a:off x="919472" y="3832265"/>
+              <a:ext cx="4892040" cy="12700"/>
             </a:xfrm>
             <a:prstGeom prst="line">
               <a:avLst/>
@@ -5487,7 +6617,7 @@
           </p:nvSpPr>
           <p:spPr>
             <a:xfrm>
-              <a:off x="2736363" y="4427948"/>
+              <a:off x="2713857" y="3459953"/>
               <a:ext cx="1315497" cy="369332"/>
             </a:xfrm>
             <a:prstGeom prst="rect">
@@ -5520,7 +6650,7 @@
           </p:nvCxnSpPr>
           <p:spPr>
             <a:xfrm rot="5400000">
-              <a:off x="798766" y="4659766"/>
+              <a:off x="776260" y="3691771"/>
               <a:ext cx="304800" cy="1588"/>
             </a:xfrm>
             <a:prstGeom prst="line">
@@ -5550,7 +6680,7 @@
       </p:grpSp>
       <p:grpSp>
         <p:nvGrpSpPr>
-          <p:cNvPr id="150" name="Group 149"/>
+          <p:cNvPr id="94" name="Group 93"/>
           <p:cNvGrpSpPr/>
           <p:nvPr/>
         </p:nvGrpSpPr>
@@ -6634,7 +7764,7 @@
           </p:nvCxnSpPr>
           <p:spPr>
             <a:xfrm rot="5400000">
-              <a:off x="7729861" y="5728986"/>
+              <a:off x="7726680" y="5728986"/>
               <a:ext cx="304800" cy="1588"/>
             </a:xfrm>
             <a:prstGeom prst="line">
@@ -7318,6 +8448,270 @@
           <a:chExt cx="0" cy="0"/>
         </a:xfrm>
       </p:grpSpPr>
+      <p:graphicFrame>
+        <p:nvGraphicFramePr>
+          <p:cNvPr id="4" name="Chart 3"/>
+          <p:cNvGraphicFramePr/>
+          <p:nvPr/>
+        </p:nvGraphicFramePr>
+        <p:xfrm>
+          <a:off x="1583267" y="1422400"/>
+          <a:ext cx="6578600" cy="2824480"/>
+        </p:xfrm>
+        <a:graphic>
+          <a:graphicData uri="http://schemas.openxmlformats.org/drawingml/2006/chart">
+            <c:chart xmlns:c="http://schemas.openxmlformats.org/drawingml/2006/chart" xmlns:r="http://schemas.openxmlformats.org/officeDocument/2006/relationships" r:id="rId2"/>
+          </a:graphicData>
+        </a:graphic>
+      </p:graphicFrame>
+    </p:spTree>
+  </p:cSld>
+  <p:clrMapOvr>
+    <a:masterClrMapping/>
+  </p:clrMapOvr>
+</p:sld>
+</file>
+
+<file path=ppt/slides/slide4.xml><?xml version="1.0" encoding="utf-8"?>
+<p:sld xmlns:a="http://schemas.openxmlformats.org/drawingml/2006/main" xmlns:r="http://schemas.openxmlformats.org/officeDocument/2006/relationships" xmlns:mc="http://schemas.openxmlformats.org/markup-compatibility/2006" xmlns:mv="urn:schemas-microsoft-com:mac:vml" xmlns:p="http://schemas.openxmlformats.org/presentationml/2006/main" mc:Ignorable="mv" mc:PreserveAttributes="mv:*">
+  <p:cSld>
+    <p:spTree>
+      <p:nvGrpSpPr>
+        <p:cNvPr id="1" name=""/>
+        <p:cNvGrpSpPr/>
+        <p:nvPr/>
+      </p:nvGrpSpPr>
+      <p:grpSpPr>
+        <a:xfrm>
+          <a:off x="0" y="0"/>
+          <a:ext cx="0" cy="0"/>
+          <a:chOff x="0" y="0"/>
+          <a:chExt cx="0" cy="0"/>
+        </a:xfrm>
+      </p:grpSpPr>
+      <p:graphicFrame>
+        <p:nvGraphicFramePr>
+          <p:cNvPr id="4" name="Chart 3"/>
+          <p:cNvGraphicFramePr/>
+          <p:nvPr/>
+        </p:nvGraphicFramePr>
+        <p:xfrm>
+          <a:off x="1219200" y="2016760"/>
+          <a:ext cx="6705600" cy="2824480"/>
+        </p:xfrm>
+        <a:graphic>
+          <a:graphicData uri="http://schemas.openxmlformats.org/drawingml/2006/chart">
+            <c:chart xmlns:c="http://schemas.openxmlformats.org/drawingml/2006/chart" xmlns:r="http://schemas.openxmlformats.org/officeDocument/2006/relationships" r:id="rId2"/>
+          </a:graphicData>
+        </a:graphic>
+      </p:graphicFrame>
+      <p:sp>
+        <p:nvSpPr>
+          <p:cNvPr id="5" name="TextBox 4"/>
+          <p:cNvSpPr txBox="1"/>
+          <p:nvPr/>
+        </p:nvSpPr>
+        <p:spPr>
+          <a:xfrm>
+            <a:off x="1885851" y="2311395"/>
+            <a:ext cx="357172" cy="321734"/>
+          </a:xfrm>
+          <a:prstGeom prst="rect">
+            <a:avLst/>
+          </a:prstGeom>
+        </p:spPr>
+        <p:txBody>
+          <a:bodyPr wrap="none" rtlCol="0"/>
+          <a:lstStyle>
+            <a:lvl1pPr marL="0" indent="0">
+              <a:defRPr sz="1100">
+                <a:latin typeface="+mn-lt"/>
+                <a:ea typeface="+mn-ea"/>
+                <a:cs typeface="+mn-cs"/>
+              </a:defRPr>
+            </a:lvl1pPr>
+            <a:lvl2pPr marL="457200" indent="0">
+              <a:defRPr sz="1100">
+                <a:latin typeface="+mn-lt"/>
+                <a:ea typeface="+mn-ea"/>
+                <a:cs typeface="+mn-cs"/>
+              </a:defRPr>
+            </a:lvl2pPr>
+            <a:lvl3pPr marL="914400" indent="0">
+              <a:defRPr sz="1100">
+                <a:latin typeface="+mn-lt"/>
+                <a:ea typeface="+mn-ea"/>
+                <a:cs typeface="+mn-cs"/>
+              </a:defRPr>
+            </a:lvl3pPr>
+            <a:lvl4pPr marL="1371600" indent="0">
+              <a:defRPr sz="1100">
+                <a:latin typeface="+mn-lt"/>
+                <a:ea typeface="+mn-ea"/>
+                <a:cs typeface="+mn-cs"/>
+              </a:defRPr>
+            </a:lvl4pPr>
+            <a:lvl5pPr marL="1828800" indent="0">
+              <a:defRPr sz="1100">
+                <a:latin typeface="+mn-lt"/>
+                <a:ea typeface="+mn-ea"/>
+                <a:cs typeface="+mn-cs"/>
+              </a:defRPr>
+            </a:lvl5pPr>
+            <a:lvl6pPr marL="2286000" indent="0">
+              <a:defRPr sz="1100">
+                <a:latin typeface="+mn-lt"/>
+                <a:ea typeface="+mn-ea"/>
+                <a:cs typeface="+mn-cs"/>
+              </a:defRPr>
+            </a:lvl6pPr>
+            <a:lvl7pPr marL="2743200" indent="0">
+              <a:defRPr sz="1100">
+                <a:latin typeface="+mn-lt"/>
+                <a:ea typeface="+mn-ea"/>
+                <a:cs typeface="+mn-cs"/>
+              </a:defRPr>
+            </a:lvl7pPr>
+            <a:lvl8pPr marL="3200400" indent="0">
+              <a:defRPr sz="1100">
+                <a:latin typeface="+mn-lt"/>
+                <a:ea typeface="+mn-ea"/>
+                <a:cs typeface="+mn-cs"/>
+              </a:defRPr>
+            </a:lvl8pPr>
+            <a:lvl9pPr marL="3657600" indent="0">
+              <a:defRPr sz="1100">
+                <a:latin typeface="+mn-lt"/>
+                <a:ea typeface="+mn-ea"/>
+                <a:cs typeface="+mn-cs"/>
+              </a:defRPr>
+            </a:lvl9pPr>
+          </a:lstStyle>
+          <a:p>
+            <a:r>
+              <a:rPr lang="en-US" sz="1100" dirty="0" smtClean="0"/>
+              <a:t>23.4</a:t>
+            </a:r>
+            <a:endParaRPr lang="en-US" sz="1100" dirty="0"/>
+          </a:p>
+        </p:txBody>
+      </p:sp>
+      <p:sp>
+        <p:nvSpPr>
+          <p:cNvPr id="6" name="TextBox 5"/>
+          <p:cNvSpPr txBox="1"/>
+          <p:nvPr/>
+        </p:nvSpPr>
+        <p:spPr>
+          <a:xfrm>
+            <a:off x="2209798" y="2133596"/>
+            <a:ext cx="398703" cy="262467"/>
+          </a:xfrm>
+          <a:prstGeom prst="rect">
+            <a:avLst/>
+          </a:prstGeom>
+        </p:spPr>
+        <p:txBody>
+          <a:bodyPr wrap="none" rtlCol="0"/>
+          <a:lstStyle>
+            <a:lvl1pPr marL="0" indent="0">
+              <a:defRPr sz="1100">
+                <a:latin typeface="+mn-lt"/>
+                <a:ea typeface="+mn-ea"/>
+                <a:cs typeface="+mn-cs"/>
+              </a:defRPr>
+            </a:lvl1pPr>
+            <a:lvl2pPr marL="457200" indent="0">
+              <a:defRPr sz="1100">
+                <a:latin typeface="+mn-lt"/>
+                <a:ea typeface="+mn-ea"/>
+                <a:cs typeface="+mn-cs"/>
+              </a:defRPr>
+            </a:lvl2pPr>
+            <a:lvl3pPr marL="914400" indent="0">
+              <a:defRPr sz="1100">
+                <a:latin typeface="+mn-lt"/>
+                <a:ea typeface="+mn-ea"/>
+                <a:cs typeface="+mn-cs"/>
+              </a:defRPr>
+            </a:lvl3pPr>
+            <a:lvl4pPr marL="1371600" indent="0">
+              <a:defRPr sz="1100">
+                <a:latin typeface="+mn-lt"/>
+                <a:ea typeface="+mn-ea"/>
+                <a:cs typeface="+mn-cs"/>
+              </a:defRPr>
+            </a:lvl4pPr>
+            <a:lvl5pPr marL="1828800" indent="0">
+              <a:defRPr sz="1100">
+                <a:latin typeface="+mn-lt"/>
+                <a:ea typeface="+mn-ea"/>
+                <a:cs typeface="+mn-cs"/>
+              </a:defRPr>
+            </a:lvl5pPr>
+            <a:lvl6pPr marL="2286000" indent="0">
+              <a:defRPr sz="1100">
+                <a:latin typeface="+mn-lt"/>
+                <a:ea typeface="+mn-ea"/>
+                <a:cs typeface="+mn-cs"/>
+              </a:defRPr>
+            </a:lvl6pPr>
+            <a:lvl7pPr marL="2743200" indent="0">
+              <a:defRPr sz="1100">
+                <a:latin typeface="+mn-lt"/>
+                <a:ea typeface="+mn-ea"/>
+                <a:cs typeface="+mn-cs"/>
+              </a:defRPr>
+            </a:lvl7pPr>
+            <a:lvl8pPr marL="3200400" indent="0">
+              <a:defRPr sz="1100">
+                <a:latin typeface="+mn-lt"/>
+                <a:ea typeface="+mn-ea"/>
+                <a:cs typeface="+mn-cs"/>
+              </a:defRPr>
+            </a:lvl8pPr>
+            <a:lvl9pPr marL="3657600" indent="0">
+              <a:defRPr sz="1100">
+                <a:latin typeface="+mn-lt"/>
+                <a:ea typeface="+mn-ea"/>
+                <a:cs typeface="+mn-cs"/>
+              </a:defRPr>
+            </a:lvl9pPr>
+          </a:lstStyle>
+          <a:p>
+            <a:r>
+              <a:rPr lang="en-US" sz="1100" dirty="0" smtClean="0"/>
+              <a:t>26.5</a:t>
+            </a:r>
+            <a:endParaRPr lang="en-US" sz="1100" dirty="0"/>
+          </a:p>
+        </p:txBody>
+      </p:sp>
+    </p:spTree>
+  </p:cSld>
+  <p:clrMapOvr>
+    <a:masterClrMapping/>
+  </p:clrMapOvr>
+</p:sld>
+</file>
+
+<file path=ppt/slides/slide5.xml><?xml version="1.0" encoding="utf-8"?>
+<p:sld xmlns:a="http://schemas.openxmlformats.org/drawingml/2006/main" xmlns:r="http://schemas.openxmlformats.org/officeDocument/2006/relationships" xmlns:mc="http://schemas.openxmlformats.org/markup-compatibility/2006" xmlns:mv="urn:schemas-microsoft-com:mac:vml" xmlns:p="http://schemas.openxmlformats.org/presentationml/2006/main" mc:Ignorable="mv" mc:PreserveAttributes="mv:*">
+  <p:cSld>
+    <p:spTree>
+      <p:nvGrpSpPr>
+        <p:cNvPr id="1" name=""/>
+        <p:cNvGrpSpPr/>
+        <p:nvPr/>
+      </p:nvGrpSpPr>
+      <p:grpSpPr>
+        <a:xfrm>
+          <a:off x="0" y="0"/>
+          <a:ext cx="0" cy="0"/>
+          <a:chOff x="0" y="0"/>
+          <a:chExt cx="0" cy="0"/>
+        </a:xfrm>
+      </p:grpSpPr>
       <p:grpSp>
         <p:nvGrpSpPr>
           <p:cNvPr id="31" name="Group 30"/>
@@ -7340,7 +8734,7 @@
           </p:nvSpPr>
           <p:spPr>
             <a:xfrm>
-              <a:off x="2790506" y="3371851"/>
+              <a:off x="2790506" y="3465576"/>
               <a:ext cx="1828800" cy="203199"/>
             </a:xfrm>
             <a:prstGeom prst="rect">
@@ -7389,7 +8783,7 @@
           </p:nvSpPr>
           <p:spPr>
             <a:xfrm>
-              <a:off x="2256502" y="3752850"/>
+              <a:off x="2256502" y="3831336"/>
               <a:ext cx="1828800" cy="203199"/>
             </a:xfrm>
             <a:prstGeom prst="rect">
@@ -8132,15 +9526,7 @@
             <a:p>
               <a:r>
                 <a:rPr lang="en-US" dirty="0" smtClean="0"/>
-                <a:t>Non-tracked </a:t>
-              </a:r>
-              <a:r>
-                <a:rPr lang="en-US" dirty="0" smtClean="0"/>
-                <a:t>virtual </a:t>
-              </a:r>
-              <a:r>
-                <a:rPr lang="en-US" dirty="0" smtClean="0"/>
-                <a:t>lines</a:t>
+                <a:t>Non-tracked virtual lines</a:t>
               </a:r>
               <a:endParaRPr lang="en-US" dirty="0"/>
             </a:p>
@@ -8162,7 +9548,7 @@
 </p:sld>
 </file>
 
-<file path=ppt/slides/slide4.xml><?xml version="1.0" encoding="utf-8"?>
+<file path=ppt/slides/slide6.xml><?xml version="1.0" encoding="utf-8"?>
 <p:sld xmlns:a="http://schemas.openxmlformats.org/drawingml/2006/main" xmlns:r="http://schemas.openxmlformats.org/officeDocument/2006/relationships" xmlns:mc="http://schemas.openxmlformats.org/markup-compatibility/2006" xmlns:mv="urn:schemas-microsoft-com:mac:vml" xmlns:p="http://schemas.openxmlformats.org/presentationml/2006/main" mc:Ignorable="mv" mc:PreserveAttributes="mv:*">
   <p:cSld>
     <p:spTree>

</xml_diff>